<commit_message>
PPT as of 340pm
</commit_message>
<xml_diff>
--- a/Project 1 Presentation Templatebg_ap.pptx
+++ b/Project 1 Presentation Templatebg_ap.pptx
@@ -5,25 +5,23 @@
     <p:sldMasterId id="2147483689" r:id="rId1"/>
   </p:sldMasterIdLst>
   <p:notesMasterIdLst>
-    <p:notesMasterId r:id="rId18"/>
+    <p:notesMasterId r:id="rId16"/>
   </p:notesMasterIdLst>
   <p:sldIdLst>
     <p:sldId id="256" r:id="rId2"/>
     <p:sldId id="257" r:id="rId3"/>
     <p:sldId id="258" r:id="rId4"/>
     <p:sldId id="259" r:id="rId5"/>
-    <p:sldId id="260" r:id="rId6"/>
-    <p:sldId id="264" r:id="rId7"/>
-    <p:sldId id="270" r:id="rId8"/>
-    <p:sldId id="268" r:id="rId9"/>
-    <p:sldId id="265" r:id="rId10"/>
-    <p:sldId id="271" r:id="rId11"/>
-    <p:sldId id="272" r:id="rId12"/>
-    <p:sldId id="273" r:id="rId13"/>
-    <p:sldId id="266" r:id="rId14"/>
-    <p:sldId id="261" r:id="rId15"/>
-    <p:sldId id="262" r:id="rId16"/>
-    <p:sldId id="263" r:id="rId17"/>
+    <p:sldId id="274" r:id="rId6"/>
+    <p:sldId id="260" r:id="rId7"/>
+    <p:sldId id="264" r:id="rId8"/>
+    <p:sldId id="266" r:id="rId9"/>
+    <p:sldId id="271" r:id="rId10"/>
+    <p:sldId id="265" r:id="rId11"/>
+    <p:sldId id="261" r:id="rId12"/>
+    <p:sldId id="262" r:id="rId13"/>
+    <p:sldId id="275" r:id="rId14"/>
+    <p:sldId id="263" r:id="rId15"/>
   </p:sldIdLst>
   <p:sldSz cx="12192000" cy="6858000"/>
   <p:notesSz cx="6858000" cy="9144000"/>
@@ -140,6 +138,2184 @@
     </p:extLst>
   </p:cmAuthor>
 </p:cmAuthorLst>
+</file>
+
+<file path=ppt/charts/chart1.xml><?xml version="1.0" encoding="utf-8"?>
+<c:chartSpace xmlns:c="http://schemas.openxmlformats.org/drawingml/2006/chart" xmlns:a="http://schemas.openxmlformats.org/drawingml/2006/main" xmlns:r="http://schemas.openxmlformats.org/officeDocument/2006/relationships" xmlns:c16r2="http://schemas.microsoft.com/office/drawing/2015/06/chart">
+  <c:date1904 val="0"/>
+  <c:lang val="en-US"/>
+  <c:roundedCorners val="0"/>
+  <mc:AlternateContent xmlns:mc="http://schemas.openxmlformats.org/markup-compatibility/2006">
+    <mc:Choice xmlns:c14="http://schemas.microsoft.com/office/drawing/2007/8/2/chart" Requires="c14">
+      <c14:style val="102"/>
+    </mc:Choice>
+    <mc:Fallback>
+      <c:style val="2"/>
+    </mc:Fallback>
+  </mc:AlternateContent>
+  <c:chart>
+    <c:title>
+      <c:tx>
+        <c:rich>
+          <a:bodyPr rot="0" spcFirstLastPara="1" vertOverflow="ellipsis" vert="horz" wrap="square" anchor="ctr" anchorCtr="1"/>
+          <a:lstStyle/>
+          <a:p>
+            <a:pPr>
+              <a:defRPr sz="1400" b="0" i="0" u="none" strike="noStrike" kern="1200" spc="0" baseline="0">
+                <a:solidFill>
+                  <a:schemeClr val="tx1">
+                    <a:lumMod val="65000"/>
+                    <a:lumOff val="35000"/>
+                  </a:schemeClr>
+                </a:solidFill>
+                <a:latin typeface="+mn-lt"/>
+                <a:ea typeface="+mn-ea"/>
+                <a:cs typeface="+mn-cs"/>
+              </a:defRPr>
+            </a:pPr>
+            <a:r>
+              <a:rPr lang="en-US"/>
+              <a:t>Enrollment,</a:t>
+            </a:r>
+            <a:r>
+              <a:rPr lang="en-US" baseline="0"/>
+              <a:t> Completions, and Unemployment Rates of Change </a:t>
+            </a:r>
+          </a:p>
+          <a:p>
+            <a:pPr>
+              <a:defRPr/>
+            </a:pPr>
+            <a:r>
+              <a:rPr lang="en-US" baseline="0"/>
+              <a:t>2006-2017</a:t>
+            </a:r>
+            <a:endParaRPr lang="en-US"/>
+          </a:p>
+        </c:rich>
+      </c:tx>
+      <c:overlay val="0"/>
+      <c:spPr>
+        <a:noFill/>
+        <a:ln>
+          <a:noFill/>
+        </a:ln>
+        <a:effectLst/>
+      </c:spPr>
+      <c:txPr>
+        <a:bodyPr rot="0" spcFirstLastPara="1" vertOverflow="ellipsis" vert="horz" wrap="square" anchor="ctr" anchorCtr="1"/>
+        <a:lstStyle/>
+        <a:p>
+          <a:pPr>
+            <a:defRPr sz="1400" b="0" i="0" u="none" strike="noStrike" kern="1200" spc="0" baseline="0">
+              <a:solidFill>
+                <a:schemeClr val="tx1">
+                  <a:lumMod val="65000"/>
+                  <a:lumOff val="35000"/>
+                </a:schemeClr>
+              </a:solidFill>
+              <a:latin typeface="+mn-lt"/>
+              <a:ea typeface="+mn-ea"/>
+              <a:cs typeface="+mn-cs"/>
+            </a:defRPr>
+          </a:pPr>
+          <a:endParaRPr lang="en-US"/>
+        </a:p>
+      </c:txPr>
+    </c:title>
+    <c:autoTitleDeleted val="0"/>
+    <c:plotArea>
+      <c:layout>
+        <c:manualLayout>
+          <c:layoutTarget val="inner"/>
+          <c:xMode val="edge"/>
+          <c:yMode val="edge"/>
+          <c:x val="0.10714334790224656"/>
+          <c:y val="0.15061928934010152"/>
+          <c:w val="0.80964418972466456"/>
+          <c:h val="0.75517454734401857"/>
+        </c:manualLayout>
+      </c:layout>
+      <c:lineChart>
+        <c:grouping val="standard"/>
+        <c:varyColors val="0"/>
+        <c:ser>
+          <c:idx val="1"/>
+          <c:order val="0"/>
+          <c:tx>
+            <c:strRef>
+              <c:f>enrollmentByYear_for_CombinedPl!$B$1</c:f>
+              <c:strCache>
+                <c:ptCount val="1"/>
+                <c:pt idx="0">
+                  <c:v>Enrollment</c:v>
+                </c:pt>
+              </c:strCache>
+            </c:strRef>
+          </c:tx>
+          <c:spPr>
+            <a:ln w="28575" cap="rnd">
+              <a:solidFill>
+                <a:schemeClr val="accent2"/>
+              </a:solidFill>
+              <a:round/>
+            </a:ln>
+            <a:effectLst/>
+          </c:spPr>
+          <c:marker>
+            <c:symbol val="none"/>
+          </c:marker>
+          <c:cat>
+            <c:numRef>
+              <c:f>enrollmentByYear_for_CombinedPl!$A$2:$A$14</c:f>
+              <c:numCache>
+                <c:formatCode>General</c:formatCode>
+                <c:ptCount val="12"/>
+                <c:pt idx="0">
+                  <c:v>2006</c:v>
+                </c:pt>
+                <c:pt idx="1">
+                  <c:v>2007</c:v>
+                </c:pt>
+                <c:pt idx="2">
+                  <c:v>2008</c:v>
+                </c:pt>
+                <c:pt idx="3">
+                  <c:v>2009</c:v>
+                </c:pt>
+                <c:pt idx="4">
+                  <c:v>2010</c:v>
+                </c:pt>
+                <c:pt idx="5">
+                  <c:v>2011</c:v>
+                </c:pt>
+                <c:pt idx="6">
+                  <c:v>2012</c:v>
+                </c:pt>
+                <c:pt idx="7">
+                  <c:v>2013</c:v>
+                </c:pt>
+                <c:pt idx="8">
+                  <c:v>2014</c:v>
+                </c:pt>
+                <c:pt idx="9">
+                  <c:v>2015</c:v>
+                </c:pt>
+                <c:pt idx="10">
+                  <c:v>2016</c:v>
+                </c:pt>
+                <c:pt idx="11">
+                  <c:v>2017</c:v>
+                </c:pt>
+              </c:numCache>
+            </c:numRef>
+          </c:cat>
+          <c:val>
+            <c:numRef>
+              <c:f>enrollmentByYear_for_CombinedPl!$B$2:$B$14</c:f>
+            </c:numRef>
+          </c:val>
+          <c:smooth val="0"/>
+          <c:extLst>
+            <c:ext xmlns:c16="http://schemas.microsoft.com/office/drawing/2014/chart" uri="{C3380CC4-5D6E-409C-BE32-E72D297353CC}">
+              <c16:uniqueId val="{00000000-CE9A-485A-BA6C-361EEEE53B81}"/>
+            </c:ext>
+          </c:extLst>
+        </c:ser>
+        <c:ser>
+          <c:idx val="2"/>
+          <c:order val="1"/>
+          <c:tx>
+            <c:strRef>
+              <c:f>enrollmentByYear_for_CombinedPl!$C$1</c:f>
+              <c:strCache>
+                <c:ptCount val="1"/>
+                <c:pt idx="0">
+                  <c:v>Shorter Certificates</c:v>
+                </c:pt>
+              </c:strCache>
+            </c:strRef>
+          </c:tx>
+          <c:spPr>
+            <a:ln w="28575" cap="rnd">
+              <a:solidFill>
+                <a:schemeClr val="accent3"/>
+              </a:solidFill>
+              <a:round/>
+            </a:ln>
+            <a:effectLst/>
+          </c:spPr>
+          <c:marker>
+            <c:symbol val="none"/>
+          </c:marker>
+          <c:cat>
+            <c:numRef>
+              <c:f>enrollmentByYear_for_CombinedPl!$A$2:$A$14</c:f>
+              <c:numCache>
+                <c:formatCode>General</c:formatCode>
+                <c:ptCount val="12"/>
+                <c:pt idx="0">
+                  <c:v>2006</c:v>
+                </c:pt>
+                <c:pt idx="1">
+                  <c:v>2007</c:v>
+                </c:pt>
+                <c:pt idx="2">
+                  <c:v>2008</c:v>
+                </c:pt>
+                <c:pt idx="3">
+                  <c:v>2009</c:v>
+                </c:pt>
+                <c:pt idx="4">
+                  <c:v>2010</c:v>
+                </c:pt>
+                <c:pt idx="5">
+                  <c:v>2011</c:v>
+                </c:pt>
+                <c:pt idx="6">
+                  <c:v>2012</c:v>
+                </c:pt>
+                <c:pt idx="7">
+                  <c:v>2013</c:v>
+                </c:pt>
+                <c:pt idx="8">
+                  <c:v>2014</c:v>
+                </c:pt>
+                <c:pt idx="9">
+                  <c:v>2015</c:v>
+                </c:pt>
+                <c:pt idx="10">
+                  <c:v>2016</c:v>
+                </c:pt>
+                <c:pt idx="11">
+                  <c:v>2017</c:v>
+                </c:pt>
+              </c:numCache>
+            </c:numRef>
+          </c:cat>
+          <c:val>
+            <c:numRef>
+              <c:f>enrollmentByYear_for_CombinedPl!$C$2:$C$14</c:f>
+            </c:numRef>
+          </c:val>
+          <c:smooth val="0"/>
+          <c:extLst>
+            <c:ext xmlns:c16="http://schemas.microsoft.com/office/drawing/2014/chart" uri="{C3380CC4-5D6E-409C-BE32-E72D297353CC}">
+              <c16:uniqueId val="{00000001-CE9A-485A-BA6C-361EEEE53B81}"/>
+            </c:ext>
+          </c:extLst>
+        </c:ser>
+        <c:ser>
+          <c:idx val="3"/>
+          <c:order val="2"/>
+          <c:tx>
+            <c:strRef>
+              <c:f>enrollmentByYear_for_CombinedPl!$D$1</c:f>
+              <c:strCache>
+                <c:ptCount val="1"/>
+                <c:pt idx="0">
+                  <c:v>Longer Certificates</c:v>
+                </c:pt>
+              </c:strCache>
+            </c:strRef>
+          </c:tx>
+          <c:spPr>
+            <a:ln w="28575" cap="rnd">
+              <a:solidFill>
+                <a:schemeClr val="accent4"/>
+              </a:solidFill>
+              <a:round/>
+            </a:ln>
+            <a:effectLst/>
+          </c:spPr>
+          <c:marker>
+            <c:symbol val="none"/>
+          </c:marker>
+          <c:cat>
+            <c:numRef>
+              <c:f>enrollmentByYear_for_CombinedPl!$A$2:$A$14</c:f>
+              <c:numCache>
+                <c:formatCode>General</c:formatCode>
+                <c:ptCount val="12"/>
+                <c:pt idx="0">
+                  <c:v>2006</c:v>
+                </c:pt>
+                <c:pt idx="1">
+                  <c:v>2007</c:v>
+                </c:pt>
+                <c:pt idx="2">
+                  <c:v>2008</c:v>
+                </c:pt>
+                <c:pt idx="3">
+                  <c:v>2009</c:v>
+                </c:pt>
+                <c:pt idx="4">
+                  <c:v>2010</c:v>
+                </c:pt>
+                <c:pt idx="5">
+                  <c:v>2011</c:v>
+                </c:pt>
+                <c:pt idx="6">
+                  <c:v>2012</c:v>
+                </c:pt>
+                <c:pt idx="7">
+                  <c:v>2013</c:v>
+                </c:pt>
+                <c:pt idx="8">
+                  <c:v>2014</c:v>
+                </c:pt>
+                <c:pt idx="9">
+                  <c:v>2015</c:v>
+                </c:pt>
+                <c:pt idx="10">
+                  <c:v>2016</c:v>
+                </c:pt>
+                <c:pt idx="11">
+                  <c:v>2017</c:v>
+                </c:pt>
+              </c:numCache>
+            </c:numRef>
+          </c:cat>
+          <c:val>
+            <c:numRef>
+              <c:f>enrollmentByYear_for_CombinedPl!$D$2:$D$14</c:f>
+            </c:numRef>
+          </c:val>
+          <c:smooth val="0"/>
+          <c:extLst>
+            <c:ext xmlns:c16="http://schemas.microsoft.com/office/drawing/2014/chart" uri="{C3380CC4-5D6E-409C-BE32-E72D297353CC}">
+              <c16:uniqueId val="{00000002-CE9A-485A-BA6C-361EEEE53B81}"/>
+            </c:ext>
+          </c:extLst>
+        </c:ser>
+        <c:ser>
+          <c:idx val="4"/>
+          <c:order val="3"/>
+          <c:tx>
+            <c:strRef>
+              <c:f>enrollmentByYear_for_CombinedPl!$E$1</c:f>
+              <c:strCache>
+                <c:ptCount val="1"/>
+                <c:pt idx="0">
+                  <c:v>Associates Degree</c:v>
+                </c:pt>
+              </c:strCache>
+            </c:strRef>
+          </c:tx>
+          <c:spPr>
+            <a:ln w="28575" cap="rnd">
+              <a:solidFill>
+                <a:schemeClr val="accent5"/>
+              </a:solidFill>
+              <a:round/>
+            </a:ln>
+            <a:effectLst/>
+          </c:spPr>
+          <c:marker>
+            <c:symbol val="none"/>
+          </c:marker>
+          <c:cat>
+            <c:numRef>
+              <c:f>enrollmentByYear_for_CombinedPl!$A$2:$A$14</c:f>
+              <c:numCache>
+                <c:formatCode>General</c:formatCode>
+                <c:ptCount val="12"/>
+                <c:pt idx="0">
+                  <c:v>2006</c:v>
+                </c:pt>
+                <c:pt idx="1">
+                  <c:v>2007</c:v>
+                </c:pt>
+                <c:pt idx="2">
+                  <c:v>2008</c:v>
+                </c:pt>
+                <c:pt idx="3">
+                  <c:v>2009</c:v>
+                </c:pt>
+                <c:pt idx="4">
+                  <c:v>2010</c:v>
+                </c:pt>
+                <c:pt idx="5">
+                  <c:v>2011</c:v>
+                </c:pt>
+                <c:pt idx="6">
+                  <c:v>2012</c:v>
+                </c:pt>
+                <c:pt idx="7">
+                  <c:v>2013</c:v>
+                </c:pt>
+                <c:pt idx="8">
+                  <c:v>2014</c:v>
+                </c:pt>
+                <c:pt idx="9">
+                  <c:v>2015</c:v>
+                </c:pt>
+                <c:pt idx="10">
+                  <c:v>2016</c:v>
+                </c:pt>
+                <c:pt idx="11">
+                  <c:v>2017</c:v>
+                </c:pt>
+              </c:numCache>
+            </c:numRef>
+          </c:cat>
+          <c:val>
+            <c:numRef>
+              <c:f>enrollmentByYear_for_CombinedPl!$E$2:$E$14</c:f>
+            </c:numRef>
+          </c:val>
+          <c:smooth val="0"/>
+          <c:extLst>
+            <c:ext xmlns:c16="http://schemas.microsoft.com/office/drawing/2014/chart" uri="{C3380CC4-5D6E-409C-BE32-E72D297353CC}">
+              <c16:uniqueId val="{00000003-CE9A-485A-BA6C-361EEEE53B81}"/>
+            </c:ext>
+          </c:extLst>
+        </c:ser>
+        <c:ser>
+          <c:idx val="5"/>
+          <c:order val="4"/>
+          <c:tx>
+            <c:strRef>
+              <c:f>enrollmentByYear_for_CombinedPl!$F$1</c:f>
+              <c:strCache>
+                <c:ptCount val="1"/>
+                <c:pt idx="0">
+                  <c:v>Bachelors Degree</c:v>
+                </c:pt>
+              </c:strCache>
+            </c:strRef>
+          </c:tx>
+          <c:spPr>
+            <a:ln w="28575" cap="rnd">
+              <a:solidFill>
+                <a:schemeClr val="accent6"/>
+              </a:solidFill>
+              <a:round/>
+            </a:ln>
+            <a:effectLst/>
+          </c:spPr>
+          <c:marker>
+            <c:symbol val="none"/>
+          </c:marker>
+          <c:cat>
+            <c:numRef>
+              <c:f>enrollmentByYear_for_CombinedPl!$A$2:$A$14</c:f>
+              <c:numCache>
+                <c:formatCode>General</c:formatCode>
+                <c:ptCount val="12"/>
+                <c:pt idx="0">
+                  <c:v>2006</c:v>
+                </c:pt>
+                <c:pt idx="1">
+                  <c:v>2007</c:v>
+                </c:pt>
+                <c:pt idx="2">
+                  <c:v>2008</c:v>
+                </c:pt>
+                <c:pt idx="3">
+                  <c:v>2009</c:v>
+                </c:pt>
+                <c:pt idx="4">
+                  <c:v>2010</c:v>
+                </c:pt>
+                <c:pt idx="5">
+                  <c:v>2011</c:v>
+                </c:pt>
+                <c:pt idx="6">
+                  <c:v>2012</c:v>
+                </c:pt>
+                <c:pt idx="7">
+                  <c:v>2013</c:v>
+                </c:pt>
+                <c:pt idx="8">
+                  <c:v>2014</c:v>
+                </c:pt>
+                <c:pt idx="9">
+                  <c:v>2015</c:v>
+                </c:pt>
+                <c:pt idx="10">
+                  <c:v>2016</c:v>
+                </c:pt>
+                <c:pt idx="11">
+                  <c:v>2017</c:v>
+                </c:pt>
+              </c:numCache>
+            </c:numRef>
+          </c:cat>
+          <c:val>
+            <c:numRef>
+              <c:f>enrollmentByYear_for_CombinedPl!$F$2:$F$14</c:f>
+            </c:numRef>
+          </c:val>
+          <c:smooth val="0"/>
+          <c:extLst>
+            <c:ext xmlns:c16="http://schemas.microsoft.com/office/drawing/2014/chart" uri="{C3380CC4-5D6E-409C-BE32-E72D297353CC}">
+              <c16:uniqueId val="{00000004-CE9A-485A-BA6C-361EEEE53B81}"/>
+            </c:ext>
+          </c:extLst>
+        </c:ser>
+        <c:ser>
+          <c:idx val="6"/>
+          <c:order val="5"/>
+          <c:tx>
+            <c:strRef>
+              <c:f>enrollmentByYear_for_CombinedPl!$G$1</c:f>
+              <c:strCache>
+                <c:ptCount val="1"/>
+                <c:pt idx="0">
+                  <c:v>Total_Degree</c:v>
+                </c:pt>
+              </c:strCache>
+            </c:strRef>
+          </c:tx>
+          <c:spPr>
+            <a:ln w="28575" cap="rnd">
+              <a:solidFill>
+                <a:schemeClr val="accent1">
+                  <a:lumMod val="60000"/>
+                </a:schemeClr>
+              </a:solidFill>
+              <a:round/>
+            </a:ln>
+            <a:effectLst/>
+          </c:spPr>
+          <c:marker>
+            <c:symbol val="none"/>
+          </c:marker>
+          <c:cat>
+            <c:numRef>
+              <c:f>enrollmentByYear_for_CombinedPl!$A$2:$A$14</c:f>
+              <c:numCache>
+                <c:formatCode>General</c:formatCode>
+                <c:ptCount val="12"/>
+                <c:pt idx="0">
+                  <c:v>2006</c:v>
+                </c:pt>
+                <c:pt idx="1">
+                  <c:v>2007</c:v>
+                </c:pt>
+                <c:pt idx="2">
+                  <c:v>2008</c:v>
+                </c:pt>
+                <c:pt idx="3">
+                  <c:v>2009</c:v>
+                </c:pt>
+                <c:pt idx="4">
+                  <c:v>2010</c:v>
+                </c:pt>
+                <c:pt idx="5">
+                  <c:v>2011</c:v>
+                </c:pt>
+                <c:pt idx="6">
+                  <c:v>2012</c:v>
+                </c:pt>
+                <c:pt idx="7">
+                  <c:v>2013</c:v>
+                </c:pt>
+                <c:pt idx="8">
+                  <c:v>2014</c:v>
+                </c:pt>
+                <c:pt idx="9">
+                  <c:v>2015</c:v>
+                </c:pt>
+                <c:pt idx="10">
+                  <c:v>2016</c:v>
+                </c:pt>
+                <c:pt idx="11">
+                  <c:v>2017</c:v>
+                </c:pt>
+              </c:numCache>
+            </c:numRef>
+          </c:cat>
+          <c:val>
+            <c:numRef>
+              <c:f>enrollmentByYear_for_CombinedPl!$G$2:$G$14</c:f>
+            </c:numRef>
+          </c:val>
+          <c:smooth val="0"/>
+          <c:extLst>
+            <c:ext xmlns:c16="http://schemas.microsoft.com/office/drawing/2014/chart" uri="{C3380CC4-5D6E-409C-BE32-E72D297353CC}">
+              <c16:uniqueId val="{00000005-CE9A-485A-BA6C-361EEEE53B81}"/>
+            </c:ext>
+          </c:extLst>
+        </c:ser>
+        <c:ser>
+          <c:idx val="7"/>
+          <c:order val="6"/>
+          <c:tx>
+            <c:strRef>
+              <c:f>enrollmentByYear_for_CombinedPl!$H$1</c:f>
+              <c:strCache>
+                <c:ptCount val="1"/>
+                <c:pt idx="0">
+                  <c:v>Initial Jobless Claims</c:v>
+                </c:pt>
+              </c:strCache>
+            </c:strRef>
+          </c:tx>
+          <c:spPr>
+            <a:ln w="28575" cap="rnd">
+              <a:solidFill>
+                <a:schemeClr val="accent2">
+                  <a:lumMod val="60000"/>
+                </a:schemeClr>
+              </a:solidFill>
+              <a:round/>
+            </a:ln>
+            <a:effectLst/>
+          </c:spPr>
+          <c:marker>
+            <c:symbol val="none"/>
+          </c:marker>
+          <c:cat>
+            <c:numRef>
+              <c:f>enrollmentByYear_for_CombinedPl!$A$2:$A$14</c:f>
+              <c:numCache>
+                <c:formatCode>General</c:formatCode>
+                <c:ptCount val="12"/>
+                <c:pt idx="0">
+                  <c:v>2006</c:v>
+                </c:pt>
+                <c:pt idx="1">
+                  <c:v>2007</c:v>
+                </c:pt>
+                <c:pt idx="2">
+                  <c:v>2008</c:v>
+                </c:pt>
+                <c:pt idx="3">
+                  <c:v>2009</c:v>
+                </c:pt>
+                <c:pt idx="4">
+                  <c:v>2010</c:v>
+                </c:pt>
+                <c:pt idx="5">
+                  <c:v>2011</c:v>
+                </c:pt>
+                <c:pt idx="6">
+                  <c:v>2012</c:v>
+                </c:pt>
+                <c:pt idx="7">
+                  <c:v>2013</c:v>
+                </c:pt>
+                <c:pt idx="8">
+                  <c:v>2014</c:v>
+                </c:pt>
+                <c:pt idx="9">
+                  <c:v>2015</c:v>
+                </c:pt>
+                <c:pt idx="10">
+                  <c:v>2016</c:v>
+                </c:pt>
+                <c:pt idx="11">
+                  <c:v>2017</c:v>
+                </c:pt>
+              </c:numCache>
+            </c:numRef>
+          </c:cat>
+          <c:val>
+            <c:numRef>
+              <c:f>enrollmentByYear_for_CombinedPl!$H$2:$H$14</c:f>
+            </c:numRef>
+          </c:val>
+          <c:smooth val="0"/>
+          <c:extLst>
+            <c:ext xmlns:c16="http://schemas.microsoft.com/office/drawing/2014/chart" uri="{C3380CC4-5D6E-409C-BE32-E72D297353CC}">
+              <c16:uniqueId val="{00000006-CE9A-485A-BA6C-361EEEE53B81}"/>
+            </c:ext>
+          </c:extLst>
+        </c:ser>
+        <c:ser>
+          <c:idx val="8"/>
+          <c:order val="7"/>
+          <c:tx>
+            <c:strRef>
+              <c:f>enrollmentByYear_for_CombinedPl!$I$1</c:f>
+              <c:strCache>
+                <c:ptCount val="1"/>
+                <c:pt idx="0">
+                  <c:v>Unemployment Rate</c:v>
+                </c:pt>
+              </c:strCache>
+            </c:strRef>
+          </c:tx>
+          <c:spPr>
+            <a:ln w="28575" cap="rnd">
+              <a:solidFill>
+                <a:schemeClr val="accent3">
+                  <a:lumMod val="60000"/>
+                </a:schemeClr>
+              </a:solidFill>
+              <a:round/>
+            </a:ln>
+            <a:effectLst/>
+          </c:spPr>
+          <c:marker>
+            <c:symbol val="none"/>
+          </c:marker>
+          <c:cat>
+            <c:numRef>
+              <c:f>enrollmentByYear_for_CombinedPl!$A$2:$A$14</c:f>
+              <c:numCache>
+                <c:formatCode>General</c:formatCode>
+                <c:ptCount val="12"/>
+                <c:pt idx="0">
+                  <c:v>2006</c:v>
+                </c:pt>
+                <c:pt idx="1">
+                  <c:v>2007</c:v>
+                </c:pt>
+                <c:pt idx="2">
+                  <c:v>2008</c:v>
+                </c:pt>
+                <c:pt idx="3">
+                  <c:v>2009</c:v>
+                </c:pt>
+                <c:pt idx="4">
+                  <c:v>2010</c:v>
+                </c:pt>
+                <c:pt idx="5">
+                  <c:v>2011</c:v>
+                </c:pt>
+                <c:pt idx="6">
+                  <c:v>2012</c:v>
+                </c:pt>
+                <c:pt idx="7">
+                  <c:v>2013</c:v>
+                </c:pt>
+                <c:pt idx="8">
+                  <c:v>2014</c:v>
+                </c:pt>
+                <c:pt idx="9">
+                  <c:v>2015</c:v>
+                </c:pt>
+                <c:pt idx="10">
+                  <c:v>2016</c:v>
+                </c:pt>
+                <c:pt idx="11">
+                  <c:v>2017</c:v>
+                </c:pt>
+              </c:numCache>
+            </c:numRef>
+          </c:cat>
+          <c:val>
+            <c:numRef>
+              <c:f>enrollmentByYear_for_CombinedPl!$I$2:$I$14</c:f>
+            </c:numRef>
+          </c:val>
+          <c:smooth val="0"/>
+          <c:extLst>
+            <c:ext xmlns:c16="http://schemas.microsoft.com/office/drawing/2014/chart" uri="{C3380CC4-5D6E-409C-BE32-E72D297353CC}">
+              <c16:uniqueId val="{00000007-CE9A-485A-BA6C-361EEEE53B81}"/>
+            </c:ext>
+          </c:extLst>
+        </c:ser>
+        <c:ser>
+          <c:idx val="9"/>
+          <c:order val="8"/>
+          <c:tx>
+            <c:strRef>
+              <c:f>enrollmentByYear_for_CombinedPl!$J$1</c:f>
+              <c:strCache>
+                <c:ptCount val="1"/>
+                <c:pt idx="0">
+                  <c:v>Labor Force Participation</c:v>
+                </c:pt>
+              </c:strCache>
+            </c:strRef>
+          </c:tx>
+          <c:spPr>
+            <a:ln w="28575" cap="rnd">
+              <a:solidFill>
+                <a:schemeClr val="accent4">
+                  <a:lumMod val="60000"/>
+                </a:schemeClr>
+              </a:solidFill>
+              <a:round/>
+            </a:ln>
+            <a:effectLst/>
+          </c:spPr>
+          <c:marker>
+            <c:symbol val="none"/>
+          </c:marker>
+          <c:cat>
+            <c:numRef>
+              <c:f>enrollmentByYear_for_CombinedPl!$A$2:$A$14</c:f>
+              <c:numCache>
+                <c:formatCode>General</c:formatCode>
+                <c:ptCount val="12"/>
+                <c:pt idx="0">
+                  <c:v>2006</c:v>
+                </c:pt>
+                <c:pt idx="1">
+                  <c:v>2007</c:v>
+                </c:pt>
+                <c:pt idx="2">
+                  <c:v>2008</c:v>
+                </c:pt>
+                <c:pt idx="3">
+                  <c:v>2009</c:v>
+                </c:pt>
+                <c:pt idx="4">
+                  <c:v>2010</c:v>
+                </c:pt>
+                <c:pt idx="5">
+                  <c:v>2011</c:v>
+                </c:pt>
+                <c:pt idx="6">
+                  <c:v>2012</c:v>
+                </c:pt>
+                <c:pt idx="7">
+                  <c:v>2013</c:v>
+                </c:pt>
+                <c:pt idx="8">
+                  <c:v>2014</c:v>
+                </c:pt>
+                <c:pt idx="9">
+                  <c:v>2015</c:v>
+                </c:pt>
+                <c:pt idx="10">
+                  <c:v>2016</c:v>
+                </c:pt>
+                <c:pt idx="11">
+                  <c:v>2017</c:v>
+                </c:pt>
+              </c:numCache>
+            </c:numRef>
+          </c:cat>
+          <c:val>
+            <c:numRef>
+              <c:f>enrollmentByYear_for_CombinedPl!$J$2:$J$14</c:f>
+            </c:numRef>
+          </c:val>
+          <c:smooth val="0"/>
+          <c:extLst>
+            <c:ext xmlns:c16="http://schemas.microsoft.com/office/drawing/2014/chart" uri="{C3380CC4-5D6E-409C-BE32-E72D297353CC}">
+              <c16:uniqueId val="{00000008-CE9A-485A-BA6C-361EEEE53B81}"/>
+            </c:ext>
+          </c:extLst>
+        </c:ser>
+        <c:ser>
+          <c:idx val="10"/>
+          <c:order val="9"/>
+          <c:tx>
+            <c:strRef>
+              <c:f>enrollmentByYear_for_CombinedPl!$K$1</c:f>
+              <c:strCache>
+                <c:ptCount val="1"/>
+                <c:pt idx="0">
+                  <c:v>Enrollment Rate of change</c:v>
+                </c:pt>
+              </c:strCache>
+            </c:strRef>
+          </c:tx>
+          <c:spPr>
+            <a:ln w="28575" cap="rnd">
+              <a:solidFill>
+                <a:srgbClr val="92D050"/>
+              </a:solidFill>
+              <a:round/>
+            </a:ln>
+            <a:effectLst/>
+          </c:spPr>
+          <c:marker>
+            <c:symbol val="none"/>
+          </c:marker>
+          <c:cat>
+            <c:numRef>
+              <c:f>enrollmentByYear_for_CombinedPl!$A$2:$A$14</c:f>
+              <c:numCache>
+                <c:formatCode>General</c:formatCode>
+                <c:ptCount val="12"/>
+                <c:pt idx="0">
+                  <c:v>2006</c:v>
+                </c:pt>
+                <c:pt idx="1">
+                  <c:v>2007</c:v>
+                </c:pt>
+                <c:pt idx="2">
+                  <c:v>2008</c:v>
+                </c:pt>
+                <c:pt idx="3">
+                  <c:v>2009</c:v>
+                </c:pt>
+                <c:pt idx="4">
+                  <c:v>2010</c:v>
+                </c:pt>
+                <c:pt idx="5">
+                  <c:v>2011</c:v>
+                </c:pt>
+                <c:pt idx="6">
+                  <c:v>2012</c:v>
+                </c:pt>
+                <c:pt idx="7">
+                  <c:v>2013</c:v>
+                </c:pt>
+                <c:pt idx="8">
+                  <c:v>2014</c:v>
+                </c:pt>
+                <c:pt idx="9">
+                  <c:v>2015</c:v>
+                </c:pt>
+                <c:pt idx="10">
+                  <c:v>2016</c:v>
+                </c:pt>
+                <c:pt idx="11">
+                  <c:v>2017</c:v>
+                </c:pt>
+              </c:numCache>
+            </c:numRef>
+          </c:cat>
+          <c:val>
+            <c:numRef>
+              <c:f>enrollmentByYear_for_CombinedPl!$K$2:$K$14</c:f>
+              <c:numCache>
+                <c:formatCode>0.00%</c:formatCode>
+                <c:ptCount val="12"/>
+                <c:pt idx="0">
+                  <c:v>8.3266313464631647E-3</c:v>
+                </c:pt>
+                <c:pt idx="1">
+                  <c:v>1.4175312229361525E-2</c:v>
+                </c:pt>
+                <c:pt idx="2">
+                  <c:v>2.3416891024645059E-2</c:v>
+                </c:pt>
+                <c:pt idx="3">
+                  <c:v>5.7879158241936457E-2</c:v>
+                </c:pt>
+                <c:pt idx="4">
+                  <c:v>5.6689791194729722E-2</c:v>
+                </c:pt>
+                <c:pt idx="5">
+                  <c:v>2.6382979384981464E-2</c:v>
+                </c:pt>
+                <c:pt idx="6">
+                  <c:v>2.50353355879529E-5</c:v>
+                </c:pt>
+                <c:pt idx="7">
+                  <c:v>-1.3916479078157185E-2</c:v>
+                </c:pt>
+                <c:pt idx="8">
+                  <c:v>3.0969971731826806E-3</c:v>
+                </c:pt>
+                <c:pt idx="9">
+                  <c:v>-8.2065752990195806E-3</c:v>
+                </c:pt>
+                <c:pt idx="10">
+                  <c:v>-7.1577320288447321E-3</c:v>
+                </c:pt>
+                <c:pt idx="11">
+                  <c:v>-1.0045048999059003E-2</c:v>
+                </c:pt>
+              </c:numCache>
+            </c:numRef>
+          </c:val>
+          <c:smooth val="0"/>
+          <c:extLst>
+            <c:ext xmlns:c16="http://schemas.microsoft.com/office/drawing/2014/chart" uri="{C3380CC4-5D6E-409C-BE32-E72D297353CC}">
+              <c16:uniqueId val="{00000009-CE9A-485A-BA6C-361EEEE53B81}"/>
+            </c:ext>
+          </c:extLst>
+        </c:ser>
+        <c:dLbls>
+          <c:showLegendKey val="0"/>
+          <c:showVal val="0"/>
+          <c:showCatName val="0"/>
+          <c:showSerName val="0"/>
+          <c:showPercent val="0"/>
+          <c:showBubbleSize val="0"/>
+        </c:dLbls>
+        <c:marker val="1"/>
+        <c:smooth val="0"/>
+        <c:axId val="2136849791"/>
+        <c:axId val="2077050143"/>
+      </c:lineChart>
+      <c:lineChart>
+        <c:grouping val="standard"/>
+        <c:varyColors val="0"/>
+        <c:ser>
+          <c:idx val="11"/>
+          <c:order val="10"/>
+          <c:tx>
+            <c:strRef>
+              <c:f>enrollmentByYear_for_CombinedPl!$L$1</c:f>
+              <c:strCache>
+                <c:ptCount val="1"/>
+                <c:pt idx="0">
+                  <c:v>Total Degrees Granted Rate of Change</c:v>
+                </c:pt>
+              </c:strCache>
+            </c:strRef>
+          </c:tx>
+          <c:spPr>
+            <a:ln w="28575" cap="rnd">
+              <a:solidFill>
+                <a:schemeClr val="accent6">
+                  <a:lumMod val="60000"/>
+                </a:schemeClr>
+              </a:solidFill>
+              <a:round/>
+            </a:ln>
+            <a:effectLst/>
+          </c:spPr>
+          <c:marker>
+            <c:symbol val="none"/>
+          </c:marker>
+          <c:cat>
+            <c:numRef>
+              <c:f>enrollmentByYear_for_CombinedPl!$A$2:$A$14</c:f>
+              <c:numCache>
+                <c:formatCode>General</c:formatCode>
+                <c:ptCount val="12"/>
+                <c:pt idx="0">
+                  <c:v>2006</c:v>
+                </c:pt>
+                <c:pt idx="1">
+                  <c:v>2007</c:v>
+                </c:pt>
+                <c:pt idx="2">
+                  <c:v>2008</c:v>
+                </c:pt>
+                <c:pt idx="3">
+                  <c:v>2009</c:v>
+                </c:pt>
+                <c:pt idx="4">
+                  <c:v>2010</c:v>
+                </c:pt>
+                <c:pt idx="5">
+                  <c:v>2011</c:v>
+                </c:pt>
+                <c:pt idx="6">
+                  <c:v>2012</c:v>
+                </c:pt>
+                <c:pt idx="7">
+                  <c:v>2013</c:v>
+                </c:pt>
+                <c:pt idx="8">
+                  <c:v>2014</c:v>
+                </c:pt>
+                <c:pt idx="9">
+                  <c:v>2015</c:v>
+                </c:pt>
+                <c:pt idx="10">
+                  <c:v>2016</c:v>
+                </c:pt>
+                <c:pt idx="11">
+                  <c:v>2017</c:v>
+                </c:pt>
+              </c:numCache>
+            </c:numRef>
+          </c:cat>
+          <c:val>
+            <c:numRef>
+              <c:f>enrollmentByYear_for_CombinedPl!$L$2:$L$14</c:f>
+              <c:numCache>
+                <c:formatCode>0.00%</c:formatCode>
+                <c:ptCount val="12"/>
+                <c:pt idx="0">
+                  <c:v>-4.0025729343901695E-2</c:v>
+                </c:pt>
+                <c:pt idx="1">
+                  <c:v>-5.2696422781800534E-2</c:v>
+                </c:pt>
+                <c:pt idx="2">
+                  <c:v>-1.5834987564743219E-2</c:v>
+                </c:pt>
+                <c:pt idx="3">
+                  <c:v>0.1486564811165465</c:v>
+                </c:pt>
+                <c:pt idx="4">
+                  <c:v>0.23130487435664548</c:v>
+                </c:pt>
+                <c:pt idx="5">
+                  <c:v>-0.22327678059175482</c:v>
+                </c:pt>
+                <c:pt idx="6">
+                  <c:v>-3.904271484045263E-3</c:v>
+                </c:pt>
+                <c:pt idx="7">
+                  <c:v>-0.16341447912032037</c:v>
+                </c:pt>
+                <c:pt idx="8">
+                  <c:v>-2.3020817504938451E-2</c:v>
+                </c:pt>
+                <c:pt idx="9">
+                  <c:v>-3.6368820799958512E-2</c:v>
+                </c:pt>
+                <c:pt idx="10">
+                  <c:v>3.8279442621186766E-2</c:v>
+                </c:pt>
+                <c:pt idx="11">
+                  <c:v>2.5338756898204418E-2</c:v>
+                </c:pt>
+              </c:numCache>
+            </c:numRef>
+          </c:val>
+          <c:smooth val="0"/>
+          <c:extLst>
+            <c:ext xmlns:c16="http://schemas.microsoft.com/office/drawing/2014/chart" uri="{C3380CC4-5D6E-409C-BE32-E72D297353CC}">
+              <c16:uniqueId val="{0000000A-CE9A-485A-BA6C-361EEEE53B81}"/>
+            </c:ext>
+          </c:extLst>
+        </c:ser>
+        <c:ser>
+          <c:idx val="12"/>
+          <c:order val="11"/>
+          <c:tx>
+            <c:strRef>
+              <c:f>enrollmentByYear_for_CombinedPl!$M$1</c:f>
+              <c:strCache>
+                <c:ptCount val="1"/>
+                <c:pt idx="0">
+                  <c:v>Unemployment Annual Rate of Change</c:v>
+                </c:pt>
+              </c:strCache>
+            </c:strRef>
+          </c:tx>
+          <c:spPr>
+            <a:ln w="28575" cap="rnd">
+              <a:solidFill>
+                <a:schemeClr val="accent1">
+                  <a:lumMod val="80000"/>
+                  <a:lumOff val="20000"/>
+                </a:schemeClr>
+              </a:solidFill>
+              <a:round/>
+            </a:ln>
+            <a:effectLst/>
+          </c:spPr>
+          <c:marker>
+            <c:symbol val="none"/>
+          </c:marker>
+          <c:cat>
+            <c:numRef>
+              <c:f>enrollmentByYear_for_CombinedPl!$A$2:$A$14</c:f>
+              <c:numCache>
+                <c:formatCode>General</c:formatCode>
+                <c:ptCount val="12"/>
+                <c:pt idx="0">
+                  <c:v>2006</c:v>
+                </c:pt>
+                <c:pt idx="1">
+                  <c:v>2007</c:v>
+                </c:pt>
+                <c:pt idx="2">
+                  <c:v>2008</c:v>
+                </c:pt>
+                <c:pt idx="3">
+                  <c:v>2009</c:v>
+                </c:pt>
+                <c:pt idx="4">
+                  <c:v>2010</c:v>
+                </c:pt>
+                <c:pt idx="5">
+                  <c:v>2011</c:v>
+                </c:pt>
+                <c:pt idx="6">
+                  <c:v>2012</c:v>
+                </c:pt>
+                <c:pt idx="7">
+                  <c:v>2013</c:v>
+                </c:pt>
+                <c:pt idx="8">
+                  <c:v>2014</c:v>
+                </c:pt>
+                <c:pt idx="9">
+                  <c:v>2015</c:v>
+                </c:pt>
+                <c:pt idx="10">
+                  <c:v>2016</c:v>
+                </c:pt>
+                <c:pt idx="11">
+                  <c:v>2017</c:v>
+                </c:pt>
+              </c:numCache>
+            </c:numRef>
+          </c:cat>
+          <c:val>
+            <c:numRef>
+              <c:f>enrollmentByYear_for_CombinedPl!$M$2:$M$14</c:f>
+              <c:numCache>
+                <c:formatCode>0%</c:formatCode>
+                <c:ptCount val="12"/>
+                <c:pt idx="0">
+                  <c:v>-9.8039215686274495E-2</c:v>
+                </c:pt>
+                <c:pt idx="1">
+                  <c:v>0</c:v>
+                </c:pt>
+                <c:pt idx="2">
+                  <c:v>0.26086956521739102</c:v>
+                </c:pt>
+                <c:pt idx="3">
+                  <c:v>0.60344827586206895</c:v>
+                </c:pt>
+                <c:pt idx="4">
+                  <c:v>3.2258064516128997E-2</c:v>
+                </c:pt>
+                <c:pt idx="5">
+                  <c:v>-7.2916666666666602E-2</c:v>
+                </c:pt>
+                <c:pt idx="6">
+                  <c:v>-8.9887640449438297E-2</c:v>
+                </c:pt>
+                <c:pt idx="7">
+                  <c:v>-8.6419753086419693E-2</c:v>
+                </c:pt>
+                <c:pt idx="8">
+                  <c:v>-0.162162162162162</c:v>
+                </c:pt>
+                <c:pt idx="9">
+                  <c:v>-0.14516129032257999</c:v>
+                </c:pt>
+                <c:pt idx="10">
+                  <c:v>-7.5471698113207392E-2</c:v>
+                </c:pt>
+                <c:pt idx="11">
+                  <c:v>-0.10204081632653</c:v>
+                </c:pt>
+              </c:numCache>
+            </c:numRef>
+          </c:val>
+          <c:smooth val="0"/>
+          <c:extLst>
+            <c:ext xmlns:c16="http://schemas.microsoft.com/office/drawing/2014/chart" uri="{C3380CC4-5D6E-409C-BE32-E72D297353CC}">
+              <c16:uniqueId val="{0000000B-CE9A-485A-BA6C-361EEEE53B81}"/>
+            </c:ext>
+          </c:extLst>
+        </c:ser>
+        <c:dLbls>
+          <c:showLegendKey val="0"/>
+          <c:showVal val="0"/>
+          <c:showCatName val="0"/>
+          <c:showSerName val="0"/>
+          <c:showPercent val="0"/>
+          <c:showBubbleSize val="0"/>
+        </c:dLbls>
+        <c:marker val="1"/>
+        <c:smooth val="0"/>
+        <c:axId val="57655615"/>
+        <c:axId val="58373903"/>
+      </c:lineChart>
+      <c:catAx>
+        <c:axId val="2136849791"/>
+        <c:scaling>
+          <c:orientation val="minMax"/>
+        </c:scaling>
+        <c:delete val="0"/>
+        <c:axPos val="b"/>
+        <c:numFmt formatCode="General" sourceLinked="1"/>
+        <c:majorTickMark val="none"/>
+        <c:minorTickMark val="none"/>
+        <c:tickLblPos val="low"/>
+        <c:spPr>
+          <a:noFill/>
+          <a:ln w="9525" cap="flat" cmpd="sng" algn="ctr">
+            <a:solidFill>
+              <a:schemeClr val="tx1">
+                <a:lumMod val="15000"/>
+                <a:lumOff val="85000"/>
+              </a:schemeClr>
+            </a:solidFill>
+            <a:round/>
+          </a:ln>
+          <a:effectLst/>
+        </c:spPr>
+        <c:txPr>
+          <a:bodyPr rot="-60000000" spcFirstLastPara="1" vertOverflow="ellipsis" vert="horz" wrap="square" anchor="ctr" anchorCtr="1"/>
+          <a:lstStyle/>
+          <a:p>
+            <a:pPr>
+              <a:defRPr sz="900" b="0" i="0" u="none" strike="noStrike" kern="1200" baseline="0">
+                <a:solidFill>
+                  <a:schemeClr val="tx1">
+                    <a:lumMod val="65000"/>
+                    <a:lumOff val="35000"/>
+                  </a:schemeClr>
+                </a:solidFill>
+                <a:latin typeface="+mn-lt"/>
+                <a:ea typeface="+mn-ea"/>
+                <a:cs typeface="+mn-cs"/>
+              </a:defRPr>
+            </a:pPr>
+            <a:endParaRPr lang="en-US"/>
+          </a:p>
+        </c:txPr>
+        <c:crossAx val="2077050143"/>
+        <c:crosses val="autoZero"/>
+        <c:auto val="1"/>
+        <c:lblAlgn val="ctr"/>
+        <c:lblOffset val="100"/>
+        <c:noMultiLvlLbl val="0"/>
+      </c:catAx>
+      <c:valAx>
+        <c:axId val="2077050143"/>
+        <c:scaling>
+          <c:orientation val="minMax"/>
+        </c:scaling>
+        <c:delete val="0"/>
+        <c:axPos val="l"/>
+        <c:majorGridlines>
+          <c:spPr>
+            <a:ln w="9525" cap="flat" cmpd="sng" algn="ctr">
+              <a:solidFill>
+                <a:schemeClr val="tx1">
+                  <a:lumMod val="15000"/>
+                  <a:lumOff val="85000"/>
+                </a:schemeClr>
+              </a:solidFill>
+              <a:round/>
+            </a:ln>
+            <a:effectLst/>
+          </c:spPr>
+        </c:majorGridlines>
+        <c:title>
+          <c:tx>
+            <c:rich>
+              <a:bodyPr rot="-5400000" spcFirstLastPara="1" vertOverflow="ellipsis" vert="horz" wrap="square" anchor="ctr" anchorCtr="1"/>
+              <a:lstStyle/>
+              <a:p>
+                <a:pPr>
+                  <a:defRPr sz="1000" b="0" i="0" u="none" strike="noStrike" kern="1200" baseline="0">
+                    <a:solidFill>
+                      <a:schemeClr val="tx1">
+                        <a:lumMod val="65000"/>
+                        <a:lumOff val="35000"/>
+                      </a:schemeClr>
+                    </a:solidFill>
+                    <a:latin typeface="+mn-lt"/>
+                    <a:ea typeface="+mn-ea"/>
+                    <a:cs typeface="+mn-cs"/>
+                  </a:defRPr>
+                </a:pPr>
+                <a:r>
+                  <a:rPr lang="en-US"/>
+                  <a:t>Enrollment</a:t>
+                </a:r>
+                <a:r>
+                  <a:rPr lang="en-US" baseline="0"/>
+                  <a:t> and Completion Rates of Change (YoY, %)</a:t>
+                </a:r>
+                <a:endParaRPr lang="en-US"/>
+              </a:p>
+            </c:rich>
+          </c:tx>
+          <c:overlay val="0"/>
+          <c:spPr>
+            <a:noFill/>
+            <a:ln>
+              <a:noFill/>
+            </a:ln>
+            <a:effectLst/>
+          </c:spPr>
+          <c:txPr>
+            <a:bodyPr rot="-5400000" spcFirstLastPara="1" vertOverflow="ellipsis" vert="horz" wrap="square" anchor="ctr" anchorCtr="1"/>
+            <a:lstStyle/>
+            <a:p>
+              <a:pPr>
+                <a:defRPr sz="1000" b="0" i="0" u="none" strike="noStrike" kern="1200" baseline="0">
+                  <a:solidFill>
+                    <a:schemeClr val="tx1">
+                      <a:lumMod val="65000"/>
+                      <a:lumOff val="35000"/>
+                    </a:schemeClr>
+                  </a:solidFill>
+                  <a:latin typeface="+mn-lt"/>
+                  <a:ea typeface="+mn-ea"/>
+                  <a:cs typeface="+mn-cs"/>
+                </a:defRPr>
+              </a:pPr>
+              <a:endParaRPr lang="en-US"/>
+            </a:p>
+          </c:txPr>
+        </c:title>
+        <c:numFmt formatCode="0%" sourceLinked="0"/>
+        <c:majorTickMark val="none"/>
+        <c:minorTickMark val="none"/>
+        <c:tickLblPos val="nextTo"/>
+        <c:spPr>
+          <a:noFill/>
+          <a:ln>
+            <a:noFill/>
+          </a:ln>
+          <a:effectLst/>
+        </c:spPr>
+        <c:txPr>
+          <a:bodyPr rot="-60000000" spcFirstLastPara="1" vertOverflow="ellipsis" vert="horz" wrap="square" anchor="ctr" anchorCtr="1"/>
+          <a:lstStyle/>
+          <a:p>
+            <a:pPr>
+              <a:defRPr sz="900" b="0" i="0" u="none" strike="noStrike" kern="1200" baseline="0">
+                <a:solidFill>
+                  <a:schemeClr val="tx1">
+                    <a:lumMod val="65000"/>
+                    <a:lumOff val="35000"/>
+                  </a:schemeClr>
+                </a:solidFill>
+                <a:latin typeface="+mn-lt"/>
+                <a:ea typeface="+mn-ea"/>
+                <a:cs typeface="+mn-cs"/>
+              </a:defRPr>
+            </a:pPr>
+            <a:endParaRPr lang="en-US"/>
+          </a:p>
+        </c:txPr>
+        <c:crossAx val="2136849791"/>
+        <c:crosses val="autoZero"/>
+        <c:crossBetween val="between"/>
+      </c:valAx>
+      <c:valAx>
+        <c:axId val="58373903"/>
+        <c:scaling>
+          <c:orientation val="minMax"/>
+        </c:scaling>
+        <c:delete val="0"/>
+        <c:axPos val="r"/>
+        <c:title>
+          <c:tx>
+            <c:rich>
+              <a:bodyPr rot="-5400000" spcFirstLastPara="1" vertOverflow="ellipsis" vert="horz" wrap="square" anchor="ctr" anchorCtr="1"/>
+              <a:lstStyle/>
+              <a:p>
+                <a:pPr>
+                  <a:defRPr sz="1000" b="0" i="0" u="none" strike="noStrike" kern="1200" baseline="0">
+                    <a:solidFill>
+                      <a:schemeClr val="tx1">
+                        <a:lumMod val="65000"/>
+                        <a:lumOff val="35000"/>
+                      </a:schemeClr>
+                    </a:solidFill>
+                    <a:latin typeface="+mn-lt"/>
+                    <a:ea typeface="+mn-ea"/>
+                    <a:cs typeface="+mn-cs"/>
+                  </a:defRPr>
+                </a:pPr>
+                <a:r>
+                  <a:rPr lang="en-US"/>
+                  <a:t>Unemployment Rate of Change (%)</a:t>
+                </a:r>
+              </a:p>
+            </c:rich>
+          </c:tx>
+          <c:overlay val="0"/>
+          <c:spPr>
+            <a:noFill/>
+            <a:ln>
+              <a:noFill/>
+            </a:ln>
+            <a:effectLst/>
+          </c:spPr>
+          <c:txPr>
+            <a:bodyPr rot="-5400000" spcFirstLastPara="1" vertOverflow="ellipsis" vert="horz" wrap="square" anchor="ctr" anchorCtr="1"/>
+            <a:lstStyle/>
+            <a:p>
+              <a:pPr>
+                <a:defRPr sz="1000" b="0" i="0" u="none" strike="noStrike" kern="1200" baseline="0">
+                  <a:solidFill>
+                    <a:schemeClr val="tx1">
+                      <a:lumMod val="65000"/>
+                      <a:lumOff val="35000"/>
+                    </a:schemeClr>
+                  </a:solidFill>
+                  <a:latin typeface="+mn-lt"/>
+                  <a:ea typeface="+mn-ea"/>
+                  <a:cs typeface="+mn-cs"/>
+                </a:defRPr>
+              </a:pPr>
+              <a:endParaRPr lang="en-US"/>
+            </a:p>
+          </c:txPr>
+        </c:title>
+        <c:numFmt formatCode="0%" sourceLinked="0"/>
+        <c:majorTickMark val="out"/>
+        <c:minorTickMark val="none"/>
+        <c:tickLblPos val="nextTo"/>
+        <c:spPr>
+          <a:noFill/>
+          <a:ln>
+            <a:noFill/>
+          </a:ln>
+          <a:effectLst/>
+        </c:spPr>
+        <c:txPr>
+          <a:bodyPr rot="-60000000" spcFirstLastPara="1" vertOverflow="ellipsis" vert="horz" wrap="square" anchor="ctr" anchorCtr="1"/>
+          <a:lstStyle/>
+          <a:p>
+            <a:pPr>
+              <a:defRPr sz="900" b="0" i="0" u="none" strike="noStrike" kern="1200" baseline="0">
+                <a:solidFill>
+                  <a:schemeClr val="tx1">
+                    <a:lumMod val="65000"/>
+                    <a:lumOff val="35000"/>
+                  </a:schemeClr>
+                </a:solidFill>
+                <a:latin typeface="+mn-lt"/>
+                <a:ea typeface="+mn-ea"/>
+                <a:cs typeface="+mn-cs"/>
+              </a:defRPr>
+            </a:pPr>
+            <a:endParaRPr lang="en-US"/>
+          </a:p>
+        </c:txPr>
+        <c:crossAx val="57655615"/>
+        <c:crosses val="max"/>
+        <c:crossBetween val="between"/>
+      </c:valAx>
+      <c:catAx>
+        <c:axId val="57655615"/>
+        <c:scaling>
+          <c:orientation val="minMax"/>
+        </c:scaling>
+        <c:delete val="1"/>
+        <c:axPos val="b"/>
+        <c:numFmt formatCode="General" sourceLinked="1"/>
+        <c:majorTickMark val="out"/>
+        <c:minorTickMark val="none"/>
+        <c:tickLblPos val="nextTo"/>
+        <c:crossAx val="58373903"/>
+        <c:crosses val="autoZero"/>
+        <c:auto val="1"/>
+        <c:lblAlgn val="ctr"/>
+        <c:lblOffset val="100"/>
+        <c:noMultiLvlLbl val="0"/>
+      </c:catAx>
+      <c:spPr>
+        <a:noFill/>
+        <a:ln>
+          <a:noFill/>
+        </a:ln>
+        <a:effectLst/>
+      </c:spPr>
+    </c:plotArea>
+    <c:legend>
+      <c:legendPos val="r"/>
+      <c:layout>
+        <c:manualLayout>
+          <c:xMode val="edge"/>
+          <c:yMode val="edge"/>
+          <c:x val="0.59896588051998323"/>
+          <c:y val="0.17700734745187469"/>
+          <c:w val="0.31702400837527828"/>
+          <c:h val="0.21198911609768409"/>
+        </c:manualLayout>
+      </c:layout>
+      <c:overlay val="0"/>
+      <c:spPr>
+        <a:noFill/>
+        <a:ln>
+          <a:noFill/>
+        </a:ln>
+        <a:effectLst/>
+      </c:spPr>
+      <c:txPr>
+        <a:bodyPr rot="0" spcFirstLastPara="1" vertOverflow="ellipsis" vert="horz" wrap="square" anchor="ctr" anchorCtr="1"/>
+        <a:lstStyle/>
+        <a:p>
+          <a:pPr>
+            <a:defRPr sz="900" b="0" i="0" u="none" strike="noStrike" kern="1200" baseline="0">
+              <a:solidFill>
+                <a:schemeClr val="tx1">
+                  <a:lumMod val="65000"/>
+                  <a:lumOff val="35000"/>
+                </a:schemeClr>
+              </a:solidFill>
+              <a:latin typeface="+mn-lt"/>
+              <a:ea typeface="+mn-ea"/>
+              <a:cs typeface="+mn-cs"/>
+            </a:defRPr>
+          </a:pPr>
+          <a:endParaRPr lang="en-US"/>
+        </a:p>
+      </c:txPr>
+    </c:legend>
+    <c:plotVisOnly val="1"/>
+    <c:dispBlanksAs val="gap"/>
+    <c:extLst>
+      <c:ext xmlns:c16r3="http://schemas.microsoft.com/office/drawing/2017/03/chart" uri="{56B9EC1D-385E-4148-901F-78D8002777C0}">
+        <c16r3:dataDisplayOptions16>
+          <c16r3:dispNaAsBlank val="1"/>
+        </c16r3:dataDisplayOptions16>
+      </c:ext>
+    </c:extLst>
+    <c:showDLblsOverMax val="0"/>
+  </c:chart>
+  <c:spPr>
+    <a:noFill/>
+    <a:ln>
+      <a:noFill/>
+    </a:ln>
+    <a:effectLst/>
+  </c:spPr>
+  <c:txPr>
+    <a:bodyPr/>
+    <a:lstStyle/>
+    <a:p>
+      <a:pPr>
+        <a:defRPr/>
+      </a:pPr>
+      <a:endParaRPr lang="en-US"/>
+    </a:p>
+  </c:txPr>
+  <c:externalData r:id="rId3">
+    <c:autoUpdate val="0"/>
+  </c:externalData>
+</c:chartSpace>
+</file>
+
+<file path=ppt/charts/colors1.xml><?xml version="1.0" encoding="utf-8"?>
+<cs:colorStyle xmlns:cs="http://schemas.microsoft.com/office/drawing/2012/chartStyle" xmlns:a="http://schemas.openxmlformats.org/drawingml/2006/main" meth="cycle" id="10">
+  <a:schemeClr val="accent1"/>
+  <a:schemeClr val="accent2"/>
+  <a:schemeClr val="accent3"/>
+  <a:schemeClr val="accent4"/>
+  <a:schemeClr val="accent5"/>
+  <a:schemeClr val="accent6"/>
+  <cs:variation/>
+  <cs:variation>
+    <a:lumMod val="60000"/>
+  </cs:variation>
+  <cs:variation>
+    <a:lumMod val="80000"/>
+    <a:lumOff val="20000"/>
+  </cs:variation>
+  <cs:variation>
+    <a:lumMod val="80000"/>
+  </cs:variation>
+  <cs:variation>
+    <a:lumMod val="60000"/>
+    <a:lumOff val="40000"/>
+  </cs:variation>
+  <cs:variation>
+    <a:lumMod val="50000"/>
+  </cs:variation>
+  <cs:variation>
+    <a:lumMod val="70000"/>
+    <a:lumOff val="30000"/>
+  </cs:variation>
+  <cs:variation>
+    <a:lumMod val="70000"/>
+  </cs:variation>
+  <cs:variation>
+    <a:lumMod val="50000"/>
+    <a:lumOff val="50000"/>
+  </cs:variation>
+</cs:colorStyle>
+</file>
+
+<file path=ppt/charts/style1.xml><?xml version="1.0" encoding="utf-8"?>
+<cs:chartStyle xmlns:cs="http://schemas.microsoft.com/office/drawing/2012/chartStyle" xmlns:a="http://schemas.openxmlformats.org/drawingml/2006/main" id="227">
+  <cs:axisTitle>
+    <cs:lnRef idx="0"/>
+    <cs:fillRef idx="0"/>
+    <cs:effectRef idx="0"/>
+    <cs:fontRef idx="minor">
+      <a:schemeClr val="tx1">
+        <a:lumMod val="65000"/>
+        <a:lumOff val="35000"/>
+      </a:schemeClr>
+    </cs:fontRef>
+    <cs:defRPr sz="1000" kern="1200"/>
+  </cs:axisTitle>
+  <cs:categoryAxis>
+    <cs:lnRef idx="0"/>
+    <cs:fillRef idx="0"/>
+    <cs:effectRef idx="0"/>
+    <cs:fontRef idx="minor">
+      <a:schemeClr val="tx1">
+        <a:lumMod val="65000"/>
+        <a:lumOff val="35000"/>
+      </a:schemeClr>
+    </cs:fontRef>
+    <cs:spPr>
+      <a:ln w="9525" cap="flat" cmpd="sng" algn="ctr">
+        <a:solidFill>
+          <a:schemeClr val="tx1">
+            <a:lumMod val="15000"/>
+            <a:lumOff val="85000"/>
+          </a:schemeClr>
+        </a:solidFill>
+        <a:round/>
+      </a:ln>
+    </cs:spPr>
+    <cs:defRPr sz="900" kern="1200"/>
+  </cs:categoryAxis>
+  <cs:chartArea mods="allowNoFillOverride allowNoLineOverride">
+    <cs:lnRef idx="0"/>
+    <cs:fillRef idx="0"/>
+    <cs:effectRef idx="0"/>
+    <cs:fontRef idx="minor">
+      <a:schemeClr val="tx1"/>
+    </cs:fontRef>
+    <cs:spPr>
+      <a:solidFill>
+        <a:schemeClr val="bg1"/>
+      </a:solidFill>
+      <a:ln w="9525" cap="flat" cmpd="sng" algn="ctr">
+        <a:solidFill>
+          <a:schemeClr val="tx1">
+            <a:lumMod val="15000"/>
+            <a:lumOff val="85000"/>
+          </a:schemeClr>
+        </a:solidFill>
+        <a:round/>
+      </a:ln>
+    </cs:spPr>
+    <cs:defRPr sz="1000" kern="1200"/>
+  </cs:chartArea>
+  <cs:dataLabel>
+    <cs:lnRef idx="0"/>
+    <cs:fillRef idx="0"/>
+    <cs:effectRef idx="0"/>
+    <cs:fontRef idx="minor">
+      <a:schemeClr val="tx1">
+        <a:lumMod val="75000"/>
+        <a:lumOff val="25000"/>
+      </a:schemeClr>
+    </cs:fontRef>
+    <cs:defRPr sz="900" kern="1200"/>
+  </cs:dataLabel>
+  <cs:dataLabelCallout>
+    <cs:lnRef idx="0"/>
+    <cs:fillRef idx="0"/>
+    <cs:effectRef idx="0"/>
+    <cs:fontRef idx="minor">
+      <a:schemeClr val="dk1">
+        <a:lumMod val="65000"/>
+        <a:lumOff val="35000"/>
+      </a:schemeClr>
+    </cs:fontRef>
+    <cs:spPr>
+      <a:solidFill>
+        <a:schemeClr val="lt1"/>
+      </a:solidFill>
+      <a:ln>
+        <a:solidFill>
+          <a:schemeClr val="dk1">
+            <a:lumMod val="25000"/>
+            <a:lumOff val="75000"/>
+          </a:schemeClr>
+        </a:solidFill>
+      </a:ln>
+    </cs:spPr>
+    <cs:defRPr sz="900" kern="1200"/>
+    <cs:bodyPr rot="0" spcFirstLastPara="1" vertOverflow="clip" horzOverflow="clip" vert="horz" wrap="square" lIns="36576" tIns="18288" rIns="36576" bIns="18288" anchor="ctr" anchorCtr="1">
+      <a:spAutoFit/>
+    </cs:bodyPr>
+  </cs:dataLabelCallout>
+  <cs:dataPoint>
+    <cs:lnRef idx="0"/>
+    <cs:fillRef idx="1">
+      <cs:styleClr val="auto"/>
+    </cs:fillRef>
+    <cs:effectRef idx="0"/>
+    <cs:fontRef idx="minor">
+      <a:schemeClr val="tx1"/>
+    </cs:fontRef>
+    <cs:spPr>
+      <a:solidFill>
+        <a:schemeClr val="phClr"/>
+      </a:solidFill>
+    </cs:spPr>
+  </cs:dataPoint>
+  <cs:dataPoint3D>
+    <cs:lnRef idx="0"/>
+    <cs:fillRef idx="1">
+      <cs:styleClr val="auto"/>
+    </cs:fillRef>
+    <cs:effectRef idx="0"/>
+    <cs:fontRef idx="minor">
+      <a:schemeClr val="tx1"/>
+    </cs:fontRef>
+    <cs:spPr>
+      <a:solidFill>
+        <a:schemeClr val="phClr"/>
+      </a:solidFill>
+    </cs:spPr>
+  </cs:dataPoint3D>
+  <cs:dataPointLine>
+    <cs:lnRef idx="0">
+      <cs:styleClr val="auto"/>
+    </cs:lnRef>
+    <cs:fillRef idx="1"/>
+    <cs:effectRef idx="0"/>
+    <cs:fontRef idx="minor">
+      <a:schemeClr val="tx1"/>
+    </cs:fontRef>
+    <cs:spPr>
+      <a:ln w="28575" cap="rnd">
+        <a:solidFill>
+          <a:schemeClr val="phClr"/>
+        </a:solidFill>
+        <a:round/>
+      </a:ln>
+    </cs:spPr>
+  </cs:dataPointLine>
+  <cs:dataPointMarker>
+    <cs:lnRef idx="0">
+      <cs:styleClr val="auto"/>
+    </cs:lnRef>
+    <cs:fillRef idx="1">
+      <cs:styleClr val="auto"/>
+    </cs:fillRef>
+    <cs:effectRef idx="0"/>
+    <cs:fontRef idx="minor">
+      <a:schemeClr val="tx1"/>
+    </cs:fontRef>
+    <cs:spPr>
+      <a:solidFill>
+        <a:schemeClr val="phClr"/>
+      </a:solidFill>
+      <a:ln w="9525">
+        <a:solidFill>
+          <a:schemeClr val="phClr"/>
+        </a:solidFill>
+      </a:ln>
+    </cs:spPr>
+  </cs:dataPointMarker>
+  <cs:dataPointMarkerLayout symbol="circle" size="5"/>
+  <cs:dataPointWireframe>
+    <cs:lnRef idx="0">
+      <cs:styleClr val="auto"/>
+    </cs:lnRef>
+    <cs:fillRef idx="1"/>
+    <cs:effectRef idx="0"/>
+    <cs:fontRef idx="minor">
+      <a:schemeClr val="tx1"/>
+    </cs:fontRef>
+    <cs:spPr>
+      <a:ln w="9525" cap="rnd">
+        <a:solidFill>
+          <a:schemeClr val="phClr"/>
+        </a:solidFill>
+        <a:round/>
+      </a:ln>
+    </cs:spPr>
+  </cs:dataPointWireframe>
+  <cs:dataTable>
+    <cs:lnRef idx="0"/>
+    <cs:fillRef idx="0"/>
+    <cs:effectRef idx="0"/>
+    <cs:fontRef idx="minor">
+      <a:schemeClr val="tx1">
+        <a:lumMod val="65000"/>
+        <a:lumOff val="35000"/>
+      </a:schemeClr>
+    </cs:fontRef>
+    <cs:spPr>
+      <a:noFill/>
+      <a:ln w="9525" cap="flat" cmpd="sng" algn="ctr">
+        <a:solidFill>
+          <a:schemeClr val="tx1">
+            <a:lumMod val="15000"/>
+            <a:lumOff val="85000"/>
+          </a:schemeClr>
+        </a:solidFill>
+        <a:round/>
+      </a:ln>
+    </cs:spPr>
+    <cs:defRPr sz="900" kern="1200"/>
+  </cs:dataTable>
+  <cs:downBar>
+    <cs:lnRef idx="0"/>
+    <cs:fillRef idx="0"/>
+    <cs:effectRef idx="0"/>
+    <cs:fontRef idx="minor">
+      <a:schemeClr val="dk1"/>
+    </cs:fontRef>
+    <cs:spPr>
+      <a:solidFill>
+        <a:schemeClr val="dk1">
+          <a:lumMod val="65000"/>
+          <a:lumOff val="35000"/>
+        </a:schemeClr>
+      </a:solidFill>
+      <a:ln w="9525">
+        <a:solidFill>
+          <a:schemeClr val="tx1">
+            <a:lumMod val="65000"/>
+            <a:lumOff val="35000"/>
+          </a:schemeClr>
+        </a:solidFill>
+      </a:ln>
+    </cs:spPr>
+  </cs:downBar>
+  <cs:dropLine>
+    <cs:lnRef idx="0"/>
+    <cs:fillRef idx="0"/>
+    <cs:effectRef idx="0"/>
+    <cs:fontRef idx="minor">
+      <a:schemeClr val="tx1"/>
+    </cs:fontRef>
+    <cs:spPr>
+      <a:ln w="9525" cap="flat" cmpd="sng" algn="ctr">
+        <a:solidFill>
+          <a:schemeClr val="tx1">
+            <a:lumMod val="35000"/>
+            <a:lumOff val="65000"/>
+          </a:schemeClr>
+        </a:solidFill>
+        <a:round/>
+      </a:ln>
+    </cs:spPr>
+  </cs:dropLine>
+  <cs:errorBar>
+    <cs:lnRef idx="0"/>
+    <cs:fillRef idx="0"/>
+    <cs:effectRef idx="0"/>
+    <cs:fontRef idx="minor">
+      <a:schemeClr val="tx1"/>
+    </cs:fontRef>
+    <cs:spPr>
+      <a:ln w="9525" cap="flat" cmpd="sng" algn="ctr">
+        <a:solidFill>
+          <a:schemeClr val="tx1">
+            <a:lumMod val="65000"/>
+            <a:lumOff val="35000"/>
+          </a:schemeClr>
+        </a:solidFill>
+        <a:round/>
+      </a:ln>
+    </cs:spPr>
+  </cs:errorBar>
+  <cs:floor>
+    <cs:lnRef idx="0"/>
+    <cs:fillRef idx="0"/>
+    <cs:effectRef idx="0"/>
+    <cs:fontRef idx="minor">
+      <a:schemeClr val="tx1"/>
+    </cs:fontRef>
+    <cs:spPr>
+      <a:noFill/>
+      <a:ln>
+        <a:noFill/>
+      </a:ln>
+    </cs:spPr>
+  </cs:floor>
+  <cs:gridlineMajor>
+    <cs:lnRef idx="0"/>
+    <cs:fillRef idx="0"/>
+    <cs:effectRef idx="0"/>
+    <cs:fontRef idx="minor">
+      <a:schemeClr val="tx1"/>
+    </cs:fontRef>
+    <cs:spPr>
+      <a:ln w="9525" cap="flat" cmpd="sng" algn="ctr">
+        <a:solidFill>
+          <a:schemeClr val="tx1">
+            <a:lumMod val="15000"/>
+            <a:lumOff val="85000"/>
+          </a:schemeClr>
+        </a:solidFill>
+        <a:round/>
+      </a:ln>
+    </cs:spPr>
+  </cs:gridlineMajor>
+  <cs:gridlineMinor>
+    <cs:lnRef idx="0"/>
+    <cs:fillRef idx="0"/>
+    <cs:effectRef idx="0"/>
+    <cs:fontRef idx="minor">
+      <a:schemeClr val="tx1"/>
+    </cs:fontRef>
+    <cs:spPr>
+      <a:ln w="9525" cap="flat" cmpd="sng" algn="ctr">
+        <a:solidFill>
+          <a:schemeClr val="tx1">
+            <a:lumMod val="5000"/>
+            <a:lumOff val="95000"/>
+          </a:schemeClr>
+        </a:solidFill>
+        <a:round/>
+      </a:ln>
+    </cs:spPr>
+  </cs:gridlineMinor>
+  <cs:hiLoLine>
+    <cs:lnRef idx="0"/>
+    <cs:fillRef idx="0"/>
+    <cs:effectRef idx="0"/>
+    <cs:fontRef idx="minor">
+      <a:schemeClr val="tx1"/>
+    </cs:fontRef>
+    <cs:spPr>
+      <a:ln w="9525" cap="flat" cmpd="sng" algn="ctr">
+        <a:solidFill>
+          <a:schemeClr val="tx1">
+            <a:lumMod val="75000"/>
+            <a:lumOff val="25000"/>
+          </a:schemeClr>
+        </a:solidFill>
+        <a:round/>
+      </a:ln>
+    </cs:spPr>
+  </cs:hiLoLine>
+  <cs:leaderLine>
+    <cs:lnRef idx="0"/>
+    <cs:fillRef idx="0"/>
+    <cs:effectRef idx="0"/>
+    <cs:fontRef idx="minor">
+      <a:schemeClr val="tx1"/>
+    </cs:fontRef>
+    <cs:spPr>
+      <a:ln w="9525" cap="flat" cmpd="sng" algn="ctr">
+        <a:solidFill>
+          <a:schemeClr val="tx1">
+            <a:lumMod val="35000"/>
+            <a:lumOff val="65000"/>
+          </a:schemeClr>
+        </a:solidFill>
+        <a:round/>
+      </a:ln>
+    </cs:spPr>
+  </cs:leaderLine>
+  <cs:legend>
+    <cs:lnRef idx="0"/>
+    <cs:fillRef idx="0"/>
+    <cs:effectRef idx="0"/>
+    <cs:fontRef idx="minor">
+      <a:schemeClr val="tx1">
+        <a:lumMod val="65000"/>
+        <a:lumOff val="35000"/>
+      </a:schemeClr>
+    </cs:fontRef>
+    <cs:defRPr sz="900" kern="1200"/>
+  </cs:legend>
+  <cs:plotArea mods="allowNoFillOverride allowNoLineOverride">
+    <cs:lnRef idx="0"/>
+    <cs:fillRef idx="0"/>
+    <cs:effectRef idx="0"/>
+    <cs:fontRef idx="minor">
+      <a:schemeClr val="tx1"/>
+    </cs:fontRef>
+  </cs:plotArea>
+  <cs:plotArea3D mods="allowNoFillOverride allowNoLineOverride">
+    <cs:lnRef idx="0"/>
+    <cs:fillRef idx="0"/>
+    <cs:effectRef idx="0"/>
+    <cs:fontRef idx="minor">
+      <a:schemeClr val="tx1"/>
+    </cs:fontRef>
+  </cs:plotArea3D>
+  <cs:seriesAxis>
+    <cs:lnRef idx="0"/>
+    <cs:fillRef idx="0"/>
+    <cs:effectRef idx="0"/>
+    <cs:fontRef idx="minor">
+      <a:schemeClr val="tx1">
+        <a:lumMod val="65000"/>
+        <a:lumOff val="35000"/>
+      </a:schemeClr>
+    </cs:fontRef>
+    <cs:defRPr sz="900" kern="1200"/>
+  </cs:seriesAxis>
+  <cs:seriesLine>
+    <cs:lnRef idx="0"/>
+    <cs:fillRef idx="0"/>
+    <cs:effectRef idx="0"/>
+    <cs:fontRef idx="minor">
+      <a:schemeClr val="tx1"/>
+    </cs:fontRef>
+    <cs:spPr>
+      <a:ln w="9525" cap="flat" cmpd="sng" algn="ctr">
+        <a:solidFill>
+          <a:schemeClr val="tx1">
+            <a:lumMod val="35000"/>
+            <a:lumOff val="65000"/>
+          </a:schemeClr>
+        </a:solidFill>
+        <a:round/>
+      </a:ln>
+    </cs:spPr>
+  </cs:seriesLine>
+  <cs:title>
+    <cs:lnRef idx="0"/>
+    <cs:fillRef idx="0"/>
+    <cs:effectRef idx="0"/>
+    <cs:fontRef idx="minor">
+      <a:schemeClr val="tx1">
+        <a:lumMod val="65000"/>
+        <a:lumOff val="35000"/>
+      </a:schemeClr>
+    </cs:fontRef>
+    <cs:defRPr sz="1400" b="0" kern="1200" spc="0" baseline="0"/>
+  </cs:title>
+  <cs:trendline>
+    <cs:lnRef idx="0">
+      <cs:styleClr val="auto"/>
+    </cs:lnRef>
+    <cs:fillRef idx="0"/>
+    <cs:effectRef idx="0"/>
+    <cs:fontRef idx="minor">
+      <a:schemeClr val="tx1"/>
+    </cs:fontRef>
+    <cs:spPr>
+      <a:ln w="19050" cap="rnd">
+        <a:solidFill>
+          <a:schemeClr val="phClr"/>
+        </a:solidFill>
+        <a:prstDash val="sysDot"/>
+      </a:ln>
+    </cs:spPr>
+  </cs:trendline>
+  <cs:trendlineLabel>
+    <cs:lnRef idx="0"/>
+    <cs:fillRef idx="0"/>
+    <cs:effectRef idx="0"/>
+    <cs:fontRef idx="minor">
+      <a:schemeClr val="tx1">
+        <a:lumMod val="65000"/>
+        <a:lumOff val="35000"/>
+      </a:schemeClr>
+    </cs:fontRef>
+    <cs:defRPr sz="900" kern="1200"/>
+  </cs:trendlineLabel>
+  <cs:upBar>
+    <cs:lnRef idx="0"/>
+    <cs:fillRef idx="0"/>
+    <cs:effectRef idx="0"/>
+    <cs:fontRef idx="minor">
+      <a:schemeClr val="dk1"/>
+    </cs:fontRef>
+    <cs:spPr>
+      <a:solidFill>
+        <a:schemeClr val="lt1"/>
+      </a:solidFill>
+      <a:ln w="9525">
+        <a:solidFill>
+          <a:schemeClr val="tx1">
+            <a:lumMod val="15000"/>
+            <a:lumOff val="85000"/>
+          </a:schemeClr>
+        </a:solidFill>
+      </a:ln>
+    </cs:spPr>
+  </cs:upBar>
+  <cs:valueAxis>
+    <cs:lnRef idx="0"/>
+    <cs:fillRef idx="0"/>
+    <cs:effectRef idx="0"/>
+    <cs:fontRef idx="minor">
+      <a:schemeClr val="tx1">
+        <a:lumMod val="65000"/>
+        <a:lumOff val="35000"/>
+      </a:schemeClr>
+    </cs:fontRef>
+    <cs:defRPr sz="900" kern="1200"/>
+  </cs:valueAxis>
+  <cs:wall>
+    <cs:lnRef idx="0"/>
+    <cs:fillRef idx="0"/>
+    <cs:effectRef idx="0"/>
+    <cs:fontRef idx="minor">
+      <a:schemeClr val="tx1"/>
+    </cs:fontRef>
+    <cs:spPr>
+      <a:noFill/>
+      <a:ln>
+        <a:noFill/>
+      </a:ln>
+    </cs:spPr>
+  </cs:wall>
+</cs:chartStyle>
 </file>
 
 <file path=ppt/notesMasters/notesMaster1.xml><?xml version="1.0" encoding="utf-8"?>
@@ -724,7 +2900,7 @@
           <a:p>
             <a:fld id="{D559B289-E7DD-4037-A7F5-74A65164D4FB}" type="slidenum">
               <a:rPr lang="en-US" smtClean="0"/>
-              <a:t>7</a:t>
+              <a:t>5</a:t>
             </a:fld>
             <a:endParaRPr lang="en-US"/>
           </a:p>
@@ -733,204 +2909,7 @@
     </p:spTree>
     <p:extLst>
       <p:ext uri="{BB962C8B-B14F-4D97-AF65-F5344CB8AC3E}">
-        <p14:creationId xmlns:p14="http://schemas.microsoft.com/office/powerpoint/2010/main" val="2593227699"/>
-      </p:ext>
-    </p:extLst>
-  </p:cSld>
-  <p:clrMapOvr>
-    <a:masterClrMapping/>
-  </p:clrMapOvr>
-</p:notes>
-</file>
-
-<file path=ppt/notesSlides/notesSlide4.xml><?xml version="1.0" encoding="utf-8"?>
-<p:notes xmlns:a="http://schemas.openxmlformats.org/drawingml/2006/main" xmlns:r="http://schemas.openxmlformats.org/officeDocument/2006/relationships" xmlns:p="http://schemas.openxmlformats.org/presentationml/2006/main">
-  <p:cSld>
-    <p:spTree>
-      <p:nvGrpSpPr>
-        <p:cNvPr id="1" name=""/>
-        <p:cNvGrpSpPr/>
-        <p:nvPr/>
-      </p:nvGrpSpPr>
-      <p:grpSpPr>
-        <a:xfrm>
-          <a:off x="0" y="0"/>
-          <a:ext cx="0" cy="0"/>
-          <a:chOff x="0" y="0"/>
-          <a:chExt cx="0" cy="0"/>
-        </a:xfrm>
-      </p:grpSpPr>
-      <p:sp>
-        <p:nvSpPr>
-          <p:cNvPr id="2" name="Slide Image Placeholder 1"/>
-          <p:cNvSpPr>
-            <a:spLocks noGrp="1" noRot="1" noChangeAspect="1"/>
-          </p:cNvSpPr>
-          <p:nvPr>
-            <p:ph type="sldImg"/>
-          </p:nvPr>
-        </p:nvSpPr>
-        <p:spPr/>
-      </p:sp>
-      <p:sp>
-        <p:nvSpPr>
-          <p:cNvPr id="3" name="Notes Placeholder 2"/>
-          <p:cNvSpPr>
-            <a:spLocks noGrp="1"/>
-          </p:cNvSpPr>
-          <p:nvPr>
-            <p:ph type="body" idx="1"/>
-          </p:nvPr>
-        </p:nvSpPr>
-        <p:spPr/>
-        <p:txBody>
-          <a:bodyPr/>
-          <a:lstStyle/>
-          <a:p>
-            <a:r>
-              <a:rPr lang="en-US" dirty="0"/>
-              <a:t>We removed the column for Master’s degree awarded since it is not in our scope.</a:t>
-            </a:r>
-          </a:p>
-        </p:txBody>
-      </p:sp>
-      <p:sp>
-        <p:nvSpPr>
-          <p:cNvPr id="4" name="Slide Number Placeholder 3"/>
-          <p:cNvSpPr>
-            <a:spLocks noGrp="1"/>
-          </p:cNvSpPr>
-          <p:nvPr>
-            <p:ph type="sldNum" sz="quarter" idx="10"/>
-          </p:nvPr>
-        </p:nvSpPr>
-        <p:spPr/>
-        <p:txBody>
-          <a:bodyPr/>
-          <a:lstStyle/>
-          <a:p>
-            <a:fld id="{D559B289-E7DD-4037-A7F5-74A65164D4FB}" type="slidenum">
-              <a:rPr lang="en-US" smtClean="0"/>
-              <a:t>8</a:t>
-            </a:fld>
-            <a:endParaRPr lang="en-US"/>
-          </a:p>
-        </p:txBody>
-      </p:sp>
-    </p:spTree>
-    <p:extLst>
-      <p:ext uri="{BB962C8B-B14F-4D97-AF65-F5344CB8AC3E}">
-        <p14:creationId xmlns:p14="http://schemas.microsoft.com/office/powerpoint/2010/main" val="1215105806"/>
-      </p:ext>
-    </p:extLst>
-  </p:cSld>
-  <p:clrMapOvr>
-    <a:masterClrMapping/>
-  </p:clrMapOvr>
-</p:notes>
-</file>
-
-<file path=ppt/notesSlides/notesSlide5.xml><?xml version="1.0" encoding="utf-8"?>
-<p:notes xmlns:a="http://schemas.openxmlformats.org/drawingml/2006/main" xmlns:r="http://schemas.openxmlformats.org/officeDocument/2006/relationships" xmlns:p="http://schemas.openxmlformats.org/presentationml/2006/main">
-  <p:cSld>
-    <p:spTree>
-      <p:nvGrpSpPr>
-        <p:cNvPr id="1" name=""/>
-        <p:cNvGrpSpPr/>
-        <p:nvPr/>
-      </p:nvGrpSpPr>
-      <p:grpSpPr>
-        <a:xfrm>
-          <a:off x="0" y="0"/>
-          <a:ext cx="0" cy="0"/>
-          <a:chOff x="0" y="0"/>
-          <a:chExt cx="0" cy="0"/>
-        </a:xfrm>
-      </p:grpSpPr>
-      <p:sp>
-        <p:nvSpPr>
-          <p:cNvPr id="2" name="Slide Image Placeholder 1"/>
-          <p:cNvSpPr>
-            <a:spLocks noGrp="1" noRot="1" noChangeAspect="1"/>
-          </p:cNvSpPr>
-          <p:nvPr>
-            <p:ph type="sldImg"/>
-          </p:nvPr>
-        </p:nvSpPr>
-        <p:spPr/>
-      </p:sp>
-      <p:sp>
-        <p:nvSpPr>
-          <p:cNvPr id="3" name="Notes Placeholder 2"/>
-          <p:cNvSpPr>
-            <a:spLocks noGrp="1"/>
-          </p:cNvSpPr>
-          <p:nvPr>
-            <p:ph type="body" idx="1"/>
-          </p:nvPr>
-        </p:nvSpPr>
-        <p:spPr/>
-        <p:txBody>
-          <a:bodyPr/>
-          <a:lstStyle/>
-          <a:p>
-            <a:r>
-              <a:rPr lang="en-US" sz="1200" kern="1200" dirty="0">
-                <a:solidFill>
-                  <a:schemeClr val="tx1"/>
-                </a:solidFill>
-                <a:effectLst/>
-                <a:latin typeface="+mn-lt"/>
-                <a:ea typeface="+mn-ea"/>
-                <a:cs typeface="+mn-cs"/>
-              </a:rPr>
-              <a:t>Use to covert NaN to ‘0’:</a:t>
-            </a:r>
-          </a:p>
-          <a:p>
-            <a:r>
-              <a:rPr lang="en-US" sz="1200" kern="1200" dirty="0">
-                <a:solidFill>
-                  <a:schemeClr val="tx1"/>
-                </a:solidFill>
-                <a:effectLst/>
-                <a:latin typeface="+mn-lt"/>
-                <a:ea typeface="+mn-ea"/>
-                <a:cs typeface="+mn-cs"/>
-              </a:rPr>
-              <a:t>df.fillna(value=0)</a:t>
-            </a:r>
-            <a:endParaRPr lang="en-US" dirty="0"/>
-          </a:p>
-        </p:txBody>
-      </p:sp>
-      <p:sp>
-        <p:nvSpPr>
-          <p:cNvPr id="4" name="Slide Number Placeholder 3"/>
-          <p:cNvSpPr>
-            <a:spLocks noGrp="1"/>
-          </p:cNvSpPr>
-          <p:nvPr>
-            <p:ph type="sldNum" sz="quarter" idx="10"/>
-          </p:nvPr>
-        </p:nvSpPr>
-        <p:spPr/>
-        <p:txBody>
-          <a:bodyPr/>
-          <a:lstStyle/>
-          <a:p>
-            <a:fld id="{D559B289-E7DD-4037-A7F5-74A65164D4FB}" type="slidenum">
-              <a:rPr lang="en-US" smtClean="0"/>
-              <a:t>11</a:t>
-            </a:fld>
-            <a:endParaRPr lang="en-US"/>
-          </a:p>
-        </p:txBody>
-      </p:sp>
-    </p:spTree>
-    <p:extLst>
-      <p:ext uri="{BB962C8B-B14F-4D97-AF65-F5344CB8AC3E}">
-        <p14:creationId xmlns:p14="http://schemas.microsoft.com/office/powerpoint/2010/main" val="1550821878"/>
+        <p14:creationId xmlns:p14="http://schemas.microsoft.com/office/powerpoint/2010/main" val="2502793605"/>
       </p:ext>
     </p:extLst>
   </p:cSld>
@@ -4728,12 +6707,90 @@
           <a:chExt cx="0" cy="0"/>
         </a:xfrm>
       </p:grpSpPr>
+      <p:sp>
+        <p:nvSpPr>
+          <p:cNvPr id="10" name="TextBox 9">
+            <a:extLst>
+              <a:ext uri="{FF2B5EF4-FFF2-40B4-BE49-F238E27FC236}">
+                <a16:creationId xmlns:a16="http://schemas.microsoft.com/office/drawing/2014/main" id="{C90BB558-2007-41FD-B5AC-120BFDAB2F67}"/>
+              </a:ext>
+            </a:extLst>
+          </p:cNvPr>
+          <p:cNvSpPr txBox="1"/>
+          <p:nvPr/>
+        </p:nvSpPr>
+        <p:spPr>
+          <a:xfrm>
+            <a:off x="4214811" y="438150"/>
+            <a:ext cx="3433764" cy="369332"/>
+          </a:xfrm>
+          <a:prstGeom prst="rect">
+            <a:avLst/>
+          </a:prstGeom>
+          <a:noFill/>
+        </p:spPr>
+        <p:txBody>
+          <a:bodyPr wrap="square" rtlCol="0">
+            <a:spAutoFit/>
+          </a:bodyPr>
+          <a:lstStyle/>
+          <a:p>
+            <a:r>
+              <a:rPr lang="en-US" b="1" dirty="0">
+                <a:latin typeface="Cambria" panose="02040503050406030204" pitchFamily="18" charset="0"/>
+              </a:rPr>
+              <a:t>Summary of Degrees Awarded</a:t>
+            </a:r>
+          </a:p>
+        </p:txBody>
+      </p:sp>
+      <p:sp>
+        <p:nvSpPr>
+          <p:cNvPr id="12" name="TextBox 11">
+            <a:extLst>
+              <a:ext uri="{FF2B5EF4-FFF2-40B4-BE49-F238E27FC236}">
+                <a16:creationId xmlns:a16="http://schemas.microsoft.com/office/drawing/2014/main" id="{9A02FADB-63D2-4022-A04C-F539EFD8230D}"/>
+              </a:ext>
+            </a:extLst>
+          </p:cNvPr>
+          <p:cNvSpPr txBox="1"/>
+          <p:nvPr/>
+        </p:nvSpPr>
+        <p:spPr>
+          <a:xfrm>
+            <a:off x="0" y="5557838"/>
+            <a:ext cx="12192000" cy="369332"/>
+          </a:xfrm>
+          <a:prstGeom prst="rect">
+            <a:avLst/>
+          </a:prstGeom>
+          <a:noFill/>
+          <a:ln>
+            <a:noFill/>
+          </a:ln>
+        </p:spPr>
+        <p:txBody>
+          <a:bodyPr wrap="square" rtlCol="0">
+            <a:spAutoFit/>
+          </a:bodyPr>
+          <a:lstStyle/>
+          <a:p>
+            <a:pPr algn="ctr"/>
+            <a:r>
+              <a:rPr lang="en-US" dirty="0">
+                <a:latin typeface="Cambria" panose="02040503050406030204" pitchFamily="18" charset="0"/>
+              </a:rPr>
+              <a:t>On average ~87% of total graduates receive a Bachelor's Degree</a:t>
+            </a:r>
+          </a:p>
+        </p:txBody>
+      </p:sp>
       <p:pic>
         <p:nvPicPr>
-          <p:cNvPr id="3" name="Content Placeholder 4">
+          <p:cNvPr id="5" name="Picture 4">
             <a:extLst>
               <a:ext uri="{FF2B5EF4-FFF2-40B4-BE49-F238E27FC236}">
-                <a16:creationId xmlns:a16="http://schemas.microsoft.com/office/drawing/2014/main" id="{841C6A91-3988-41E8-A5B9-531D46631746}"/>
+                <a16:creationId xmlns:a16="http://schemas.microsoft.com/office/drawing/2014/main" id="{1E6B0EFF-5FB1-4F2C-99C8-3991C671C83E}"/>
               </a:ext>
             </a:extLst>
           </p:cNvPr>
@@ -4756,205 +6813,18 @@
         </p:blipFill>
         <p:spPr>
           <a:xfrm>
-            <a:off x="1240957" y="941289"/>
-            <a:ext cx="3731567" cy="2487711"/>
+            <a:off x="2419349" y="1328738"/>
+            <a:ext cx="6921818" cy="3714750"/>
           </a:xfrm>
           <a:prstGeom prst="rect">
             <a:avLst/>
           </a:prstGeom>
         </p:spPr>
       </p:pic>
-      <p:pic>
-        <p:nvPicPr>
-          <p:cNvPr id="5" name="Picture 4">
-            <a:extLst>
-              <a:ext uri="{FF2B5EF4-FFF2-40B4-BE49-F238E27FC236}">
-                <a16:creationId xmlns:a16="http://schemas.microsoft.com/office/drawing/2014/main" id="{6B43BB14-CDCB-4A98-A3D7-FBA8E3BA42A3}"/>
-              </a:ext>
-            </a:extLst>
-          </p:cNvPr>
-          <p:cNvPicPr>
-            <a:picLocks noChangeAspect="1"/>
-          </p:cNvPicPr>
-          <p:nvPr/>
-        </p:nvPicPr>
-        <p:blipFill>
-          <a:blip r:embed="rId3">
-            <a:extLst>
-              <a:ext uri="{28A0092B-C50C-407E-A947-70E740481C1C}">
-                <a14:useLocalDpi xmlns:a14="http://schemas.microsoft.com/office/drawing/2010/main" val="0"/>
-              </a:ext>
-            </a:extLst>
-          </a:blip>
-          <a:stretch>
-            <a:fillRect/>
-          </a:stretch>
-        </p:blipFill>
-        <p:spPr>
-          <a:xfrm>
-            <a:off x="5431556" y="1011310"/>
-            <a:ext cx="3731567" cy="2347669"/>
-          </a:xfrm>
-          <a:prstGeom prst="rect">
-            <a:avLst/>
-          </a:prstGeom>
-        </p:spPr>
-      </p:pic>
-      <p:pic>
-        <p:nvPicPr>
-          <p:cNvPr id="7" name="Picture 6">
-            <a:extLst>
-              <a:ext uri="{FF2B5EF4-FFF2-40B4-BE49-F238E27FC236}">
-                <a16:creationId xmlns:a16="http://schemas.microsoft.com/office/drawing/2014/main" id="{92A0B9B8-9566-4E3D-9D7B-DDED255C00CC}"/>
-              </a:ext>
-            </a:extLst>
-          </p:cNvPr>
-          <p:cNvPicPr>
-            <a:picLocks noChangeAspect="1"/>
-          </p:cNvPicPr>
-          <p:nvPr/>
-        </p:nvPicPr>
-        <p:blipFill>
-          <a:blip r:embed="rId4">
-            <a:extLst>
-              <a:ext uri="{28A0092B-C50C-407E-A947-70E740481C1C}">
-                <a14:useLocalDpi xmlns:a14="http://schemas.microsoft.com/office/drawing/2010/main" val="0"/>
-              </a:ext>
-            </a:extLst>
-          </a:blip>
-          <a:stretch>
-            <a:fillRect/>
-          </a:stretch>
-        </p:blipFill>
-        <p:spPr>
-          <a:xfrm>
-            <a:off x="1334940" y="3429000"/>
-            <a:ext cx="3591549" cy="2394366"/>
-          </a:xfrm>
-          <a:prstGeom prst="rect">
-            <a:avLst/>
-          </a:prstGeom>
-        </p:spPr>
-      </p:pic>
-      <p:pic>
-        <p:nvPicPr>
-          <p:cNvPr id="8" name="Picture 7">
-            <a:extLst>
-              <a:ext uri="{FF2B5EF4-FFF2-40B4-BE49-F238E27FC236}">
-                <a16:creationId xmlns:a16="http://schemas.microsoft.com/office/drawing/2014/main" id="{513F7AF9-E817-4E93-B4B3-D108A664A603}"/>
-              </a:ext>
-            </a:extLst>
-          </p:cNvPr>
-          <p:cNvPicPr>
-            <a:picLocks noChangeAspect="1"/>
-          </p:cNvPicPr>
-          <p:nvPr/>
-        </p:nvPicPr>
-        <p:blipFill>
-          <a:blip r:embed="rId5">
-            <a:extLst>
-              <a:ext uri="{28A0092B-C50C-407E-A947-70E740481C1C}">
-                <a14:useLocalDpi xmlns:a14="http://schemas.microsoft.com/office/drawing/2010/main" val="0"/>
-              </a:ext>
-            </a:extLst>
-          </a:blip>
-          <a:stretch>
-            <a:fillRect/>
-          </a:stretch>
-        </p:blipFill>
-        <p:spPr>
-          <a:xfrm>
-            <a:off x="5431557" y="3358979"/>
-            <a:ext cx="3731566" cy="2487710"/>
-          </a:xfrm>
-          <a:prstGeom prst="rect">
-            <a:avLst/>
-          </a:prstGeom>
-        </p:spPr>
-      </p:pic>
-      <p:sp>
-        <p:nvSpPr>
-          <p:cNvPr id="11" name="TextBox 10">
-            <a:extLst>
-              <a:ext uri="{FF2B5EF4-FFF2-40B4-BE49-F238E27FC236}">
-                <a16:creationId xmlns:a16="http://schemas.microsoft.com/office/drawing/2014/main" id="{BA4D5888-1E1E-4C24-B911-50ECB52C5AE7}"/>
-              </a:ext>
-            </a:extLst>
-          </p:cNvPr>
-          <p:cNvSpPr txBox="1"/>
-          <p:nvPr/>
-        </p:nvSpPr>
-        <p:spPr>
-          <a:xfrm>
-            <a:off x="3917081" y="560289"/>
-            <a:ext cx="3028950" cy="381000"/>
-          </a:xfrm>
-          <a:prstGeom prst="rect">
-            <a:avLst/>
-          </a:prstGeom>
-          <a:noFill/>
-        </p:spPr>
-        <p:txBody>
-          <a:bodyPr wrap="square" rtlCol="0">
-            <a:spAutoFit/>
-          </a:bodyPr>
-          <a:lstStyle/>
-          <a:p>
-            <a:r>
-              <a:rPr lang="en-US" b="1" dirty="0">
-                <a:latin typeface="Cambria" panose="02040503050406030204" pitchFamily="18" charset="0"/>
-              </a:rPr>
-              <a:t>Trend in Degrees Awarded</a:t>
-            </a:r>
-          </a:p>
-        </p:txBody>
-      </p:sp>
-      <p:sp>
-        <p:nvSpPr>
-          <p:cNvPr id="12" name="TextBox 11">
-            <a:extLst>
-              <a:ext uri="{FF2B5EF4-FFF2-40B4-BE49-F238E27FC236}">
-                <a16:creationId xmlns:a16="http://schemas.microsoft.com/office/drawing/2014/main" id="{B2E1C9D1-3FC3-4F1B-BC89-1CC7AD233D66}"/>
-              </a:ext>
-            </a:extLst>
-          </p:cNvPr>
-          <p:cNvSpPr txBox="1"/>
-          <p:nvPr/>
-        </p:nvSpPr>
-        <p:spPr>
-          <a:xfrm>
-            <a:off x="9248848" y="2481816"/>
-            <a:ext cx="1787920" cy="1323439"/>
-          </a:xfrm>
-          <a:prstGeom prst="rect">
-            <a:avLst/>
-          </a:prstGeom>
-          <a:noFill/>
-          <a:ln>
-            <a:solidFill>
-              <a:srgbClr val="0033CC"/>
-            </a:solidFill>
-          </a:ln>
-        </p:spPr>
-        <p:txBody>
-          <a:bodyPr wrap="square" rtlCol="0">
-            <a:spAutoFit/>
-          </a:bodyPr>
-          <a:lstStyle/>
-          <a:p>
-            <a:r>
-              <a:rPr lang="en-US" sz="1600" dirty="0">
-                <a:latin typeface="Cambria" panose="02040503050406030204" pitchFamily="18" charset="0"/>
-              </a:rPr>
-              <a:t>Increase in short term degrees with increase in unemployment rate</a:t>
-            </a:r>
-          </a:p>
-        </p:txBody>
-      </p:sp>
     </p:spTree>
     <p:extLst>
       <p:ext uri="{BB962C8B-B14F-4D97-AF65-F5344CB8AC3E}">
-        <p14:creationId xmlns:p14="http://schemas.microsoft.com/office/powerpoint/2010/main" val="1012556742"/>
+        <p14:creationId xmlns:p14="http://schemas.microsoft.com/office/powerpoint/2010/main" val="3132460201"/>
       </p:ext>
     </p:extLst>
   </p:cSld>
@@ -4981,213 +6851,99 @@
           <a:chExt cx="0" cy="0"/>
         </a:xfrm>
       </p:grpSpPr>
-      <p:pic>
-        <p:nvPicPr>
-          <p:cNvPr id="3" name="Picture 2">
+      <p:sp>
+        <p:nvSpPr>
+          <p:cNvPr id="2" name="Title 1">
             <a:extLst>
               <a:ext uri="{FF2B5EF4-FFF2-40B4-BE49-F238E27FC236}">
-                <a16:creationId xmlns:a16="http://schemas.microsoft.com/office/drawing/2014/main" id="{834DFBB3-910A-4627-97A3-F1C787CD3969}"/>
+                <a16:creationId xmlns:a16="http://schemas.microsoft.com/office/drawing/2014/main" id="{0585AFDD-15A8-49BD-A991-AC342AB3A002}"/>
               </a:ext>
             </a:extLst>
           </p:cNvPr>
-          <p:cNvPicPr>
-            <a:picLocks noChangeAspect="1"/>
-          </p:cNvPicPr>
-          <p:nvPr/>
-        </p:nvPicPr>
-        <p:blipFill>
-          <a:blip r:embed="rId3">
-            <a:extLst>
-              <a:ext uri="{28A0092B-C50C-407E-A947-70E740481C1C}">
-                <a14:useLocalDpi xmlns:a14="http://schemas.microsoft.com/office/drawing/2010/main" val="0"/>
-              </a:ext>
-            </a:extLst>
-          </a:blip>
-          <a:stretch>
-            <a:fillRect/>
-          </a:stretch>
-        </p:blipFill>
-        <p:spPr>
-          <a:xfrm>
-            <a:off x="1218575" y="1028285"/>
-            <a:ext cx="3439150" cy="2292766"/>
-          </a:xfrm>
-          <a:prstGeom prst="rect">
-            <a:avLst/>
-          </a:prstGeom>
-        </p:spPr>
-      </p:pic>
-      <p:pic>
-        <p:nvPicPr>
-          <p:cNvPr id="5" name="Picture 4">
+          <p:cNvSpPr>
+            <a:spLocks noGrp="1"/>
+          </p:cNvSpPr>
+          <p:nvPr>
+            <p:ph type="title"/>
+          </p:nvPr>
+        </p:nvSpPr>
+        <p:spPr/>
+        <p:txBody>
+          <a:bodyPr/>
+          <a:lstStyle/>
+          <a:p>
+            <a:r>
+              <a:rPr lang="en-US" dirty="0"/>
+              <a:t>Findings</a:t>
+            </a:r>
+          </a:p>
+        </p:txBody>
+      </p:sp>
+      <p:sp>
+        <p:nvSpPr>
+          <p:cNvPr id="3" name="Content Placeholder 2">
             <a:extLst>
               <a:ext uri="{FF2B5EF4-FFF2-40B4-BE49-F238E27FC236}">
-                <a16:creationId xmlns:a16="http://schemas.microsoft.com/office/drawing/2014/main" id="{5EA61835-5BEC-481A-8833-B12781F2F736}"/>
+                <a16:creationId xmlns:a16="http://schemas.microsoft.com/office/drawing/2014/main" id="{30C4F1C1-804B-4A2E-836E-DCB09E48F49D}"/>
               </a:ext>
             </a:extLst>
           </p:cNvPr>
-          <p:cNvPicPr>
-            <a:picLocks noChangeAspect="1"/>
-          </p:cNvPicPr>
-          <p:nvPr/>
-        </p:nvPicPr>
-        <p:blipFill>
-          <a:blip r:embed="rId4">
-            <a:extLst>
-              <a:ext uri="{28A0092B-C50C-407E-A947-70E740481C1C}">
-                <a14:useLocalDpi xmlns:a14="http://schemas.microsoft.com/office/drawing/2010/main" val="0"/>
-              </a:ext>
-            </a:extLst>
-          </a:blip>
-          <a:stretch>
-            <a:fillRect/>
-          </a:stretch>
-        </p:blipFill>
-        <p:spPr>
-          <a:xfrm>
-            <a:off x="5171453" y="942560"/>
-            <a:ext cx="3439150" cy="2292767"/>
-          </a:xfrm>
-          <a:prstGeom prst="rect">
-            <a:avLst/>
-          </a:prstGeom>
-        </p:spPr>
-      </p:pic>
-      <p:pic>
-        <p:nvPicPr>
-          <p:cNvPr id="7" name="Picture 6">
+          <p:cNvSpPr>
+            <a:spLocks noGrp="1"/>
+          </p:cNvSpPr>
+          <p:nvPr>
+            <p:ph idx="1"/>
+          </p:nvPr>
+        </p:nvSpPr>
+        <p:spPr/>
+        <p:txBody>
+          <a:bodyPr/>
+          <a:lstStyle/>
+          <a:p>
+            <a:br>
+              <a:rPr lang="en-US" dirty="0"/>
+            </a:br>
+            <a:endParaRPr lang="en-US" dirty="0"/>
+          </a:p>
+          <a:p>
+            <a:endParaRPr lang="en-US" dirty="0"/>
+          </a:p>
+        </p:txBody>
+      </p:sp>
+      <p:graphicFrame>
+        <p:nvGraphicFramePr>
+          <p:cNvPr id="5" name="Chart 4">
             <a:extLst>
               <a:ext uri="{FF2B5EF4-FFF2-40B4-BE49-F238E27FC236}">
-                <a16:creationId xmlns:a16="http://schemas.microsoft.com/office/drawing/2014/main" id="{0F0F6C04-1D2B-4868-8511-34941CC990DF}"/>
+                <a16:creationId xmlns:a16="http://schemas.microsoft.com/office/drawing/2014/main" id="{3AB79BFD-7B11-4F30-970D-214265C2D075}"/>
               </a:ext>
             </a:extLst>
           </p:cNvPr>
-          <p:cNvPicPr>
-            <a:picLocks noChangeAspect="1"/>
-          </p:cNvPicPr>
-          <p:nvPr/>
-        </p:nvPicPr>
-        <p:blipFill>
-          <a:blip r:embed="rId5">
-            <a:extLst>
-              <a:ext uri="{28A0092B-C50C-407E-A947-70E740481C1C}">
-                <a14:useLocalDpi xmlns:a14="http://schemas.microsoft.com/office/drawing/2010/main" val="0"/>
-              </a:ext>
-            </a:extLst>
-          </a:blip>
-          <a:stretch>
-            <a:fillRect/>
-          </a:stretch>
-        </p:blipFill>
-        <p:spPr>
-          <a:xfrm>
-            <a:off x="1297311" y="3641930"/>
-            <a:ext cx="3281678" cy="2187785"/>
-          </a:xfrm>
-          <a:prstGeom prst="rect">
-            <a:avLst/>
-          </a:prstGeom>
-        </p:spPr>
-      </p:pic>
-      <p:sp>
-        <p:nvSpPr>
-          <p:cNvPr id="8" name="TextBox 7">
-            <a:extLst>
-              <a:ext uri="{FF2B5EF4-FFF2-40B4-BE49-F238E27FC236}">
-                <a16:creationId xmlns:a16="http://schemas.microsoft.com/office/drawing/2014/main" id="{333B4730-A882-4500-9E70-6E7D3E2426EB}"/>
-              </a:ext>
-            </a:extLst>
-          </p:cNvPr>
-          <p:cNvSpPr txBox="1"/>
-          <p:nvPr/>
-        </p:nvSpPr>
-        <p:spPr>
-          <a:xfrm>
-            <a:off x="5572125" y="3622674"/>
-            <a:ext cx="2952750" cy="2062103"/>
-          </a:xfrm>
-          <a:prstGeom prst="rect">
-            <a:avLst/>
-          </a:prstGeom>
-          <a:noFill/>
-          <a:ln>
-            <a:solidFill>
-              <a:srgbClr val="0033CC"/>
-            </a:solidFill>
-          </a:ln>
-        </p:spPr>
-        <p:txBody>
-          <a:bodyPr wrap="square" rtlCol="0">
-            <a:spAutoFit/>
-          </a:bodyPr>
-          <a:lstStyle/>
-          <a:p>
-            <a:r>
-              <a:rPr lang="en-US" sz="1600" dirty="0">
-                <a:latin typeface="Cambria" panose="02040503050406030204" pitchFamily="18" charset="0"/>
-              </a:rPr>
-              <a:t>*Deleting empty cells with .dropna function in a multicolumn data frame causes mis-representation of data.</a:t>
-            </a:r>
-          </a:p>
-          <a:p>
-            <a:r>
-              <a:rPr lang="en-US" sz="1600" dirty="0">
-                <a:latin typeface="Cambria" panose="02040503050406030204" pitchFamily="18" charset="0"/>
-              </a:rPr>
-              <a:t>*With .dropna, deleted ~11,000 rows!</a:t>
-            </a:r>
-          </a:p>
-          <a:p>
-            <a:r>
-              <a:rPr lang="en-US" sz="1600" dirty="0">
-                <a:latin typeface="Cambria" panose="02040503050406030204" pitchFamily="18" charset="0"/>
-              </a:rPr>
-              <a:t>*Convert NaN to ‘0’ value instead.  </a:t>
-            </a:r>
-          </a:p>
-        </p:txBody>
-      </p:sp>
-      <p:sp>
-        <p:nvSpPr>
-          <p:cNvPr id="9" name="TextBox 8">
-            <a:extLst>
-              <a:ext uri="{FF2B5EF4-FFF2-40B4-BE49-F238E27FC236}">
-                <a16:creationId xmlns:a16="http://schemas.microsoft.com/office/drawing/2014/main" id="{5E93BCD9-0111-4916-BDD3-FFC9E2BBB2D8}"/>
-              </a:ext>
-            </a:extLst>
-          </p:cNvPr>
-          <p:cNvSpPr txBox="1"/>
-          <p:nvPr/>
-        </p:nvSpPr>
-        <p:spPr>
-          <a:xfrm>
-            <a:off x="2495550" y="371475"/>
-            <a:ext cx="4791075" cy="369332"/>
-          </a:xfrm>
-          <a:prstGeom prst="rect">
-            <a:avLst/>
-          </a:prstGeom>
-          <a:noFill/>
-        </p:spPr>
-        <p:txBody>
-          <a:bodyPr wrap="square" rtlCol="0">
-            <a:spAutoFit/>
-          </a:bodyPr>
-          <a:lstStyle/>
-          <a:p>
-            <a:r>
-              <a:rPr lang="en-US" b="1" dirty="0">
-                <a:latin typeface="Cambria" panose="02040503050406030204" pitchFamily="18" charset="0"/>
-              </a:rPr>
-              <a:t>.dropna function to delete empty cells</a:t>
-            </a:r>
-          </a:p>
-        </p:txBody>
-      </p:sp>
+          <p:cNvGraphicFramePr>
+            <a:graphicFrameLocks/>
+          </p:cNvGraphicFramePr>
+          <p:nvPr>
+            <p:extLst>
+              <p:ext uri="{D42A27DB-BD31-4B8C-83A1-F6EECF244321}">
+                <p14:modId xmlns:p14="http://schemas.microsoft.com/office/powerpoint/2010/main" val="3659691641"/>
+              </p:ext>
+            </p:extLst>
+          </p:nvPr>
+        </p:nvGraphicFramePr>
+        <p:xfrm>
+          <a:off x="1492062" y="1845734"/>
+          <a:ext cx="9266426" cy="4365627"/>
+        </p:xfrm>
+        <a:graphic>
+          <a:graphicData uri="http://schemas.openxmlformats.org/drawingml/2006/chart">
+            <c:chart xmlns:c="http://schemas.openxmlformats.org/drawingml/2006/chart" xmlns:r="http://schemas.openxmlformats.org/officeDocument/2006/relationships" r:id="rId2"/>
+          </a:graphicData>
+        </a:graphic>
+      </p:graphicFrame>
     </p:spTree>
     <p:extLst>
       <p:ext uri="{BB962C8B-B14F-4D97-AF65-F5344CB8AC3E}">
-        <p14:creationId xmlns:p14="http://schemas.microsoft.com/office/powerpoint/2010/main" val="3401144694"/>
+        <p14:creationId xmlns:p14="http://schemas.microsoft.com/office/powerpoint/2010/main" val="1047368940"/>
       </p:ext>
     </p:extLst>
   </p:cSld>
@@ -5219,7 +6975,7 @@
           <p:cNvPr id="2" name="Title 1">
             <a:extLst>
               <a:ext uri="{FF2B5EF4-FFF2-40B4-BE49-F238E27FC236}">
-                <a16:creationId xmlns:a16="http://schemas.microsoft.com/office/drawing/2014/main" id="{4E118015-6C12-4645-A753-41ABF44629CC}"/>
+                <a16:creationId xmlns:a16="http://schemas.microsoft.com/office/drawing/2014/main" id="{0585AFDD-15A8-49BD-A991-AC342AB3A002}"/>
               </a:ext>
             </a:extLst>
           </p:cNvPr>
@@ -5230,54 +6986,197 @@
             <p:ph type="title"/>
           </p:nvPr>
         </p:nvSpPr>
-        <p:spPr/>
+        <p:spPr>
+          <a:xfrm>
+            <a:off x="654368" y="286603"/>
+            <a:ext cx="10501312" cy="1450757"/>
+          </a:xfrm>
+        </p:spPr>
         <p:txBody>
           <a:bodyPr/>
           <a:lstStyle/>
           <a:p>
-            <a:endParaRPr lang="en-US"/>
+            <a:r>
+              <a:rPr lang="en-US" dirty="0"/>
+              <a:t>Post Mortem</a:t>
+            </a:r>
+          </a:p>
+        </p:txBody>
+      </p:sp>
+      <p:sp>
+        <p:nvSpPr>
+          <p:cNvPr id="3" name="Content Placeholder 2">
+            <a:extLst>
+              <a:ext uri="{FF2B5EF4-FFF2-40B4-BE49-F238E27FC236}">
+                <a16:creationId xmlns:a16="http://schemas.microsoft.com/office/drawing/2014/main" id="{30C4F1C1-804B-4A2E-836E-DCB09E48F49D}"/>
+              </a:ext>
+            </a:extLst>
+          </p:cNvPr>
+          <p:cNvSpPr>
+            <a:spLocks noGrp="1"/>
+          </p:cNvSpPr>
+          <p:nvPr>
+            <p:ph idx="1"/>
+          </p:nvPr>
+        </p:nvSpPr>
+        <p:spPr>
+          <a:xfrm>
+            <a:off x="654368" y="1845734"/>
+            <a:ext cx="10058400" cy="4023360"/>
+          </a:xfrm>
+        </p:spPr>
+        <p:txBody>
+          <a:bodyPr>
+            <a:normAutofit fontScale="92500" lnSpcReduction="10000"/>
+          </a:bodyPr>
+          <a:lstStyle/>
+          <a:p>
+            <a:r>
+              <a:rPr lang="en-US" b="1" dirty="0"/>
+              <a:t>Difficulties</a:t>
+            </a:r>
+          </a:p>
+          <a:p>
+            <a:pPr>
+              <a:buFont typeface="Arial" panose="020B0604020202020204" pitchFamily="34" charset="0"/>
+              <a:buChar char="•"/>
+            </a:pPr>
+            <a:r>
+              <a:rPr lang="en-US" dirty="0"/>
+              <a:t>  </a:t>
+            </a:r>
+            <a:r>
+              <a:rPr lang="en-CA" sz="2100" dirty="0"/>
+              <a:t> Limited data</a:t>
+            </a:r>
+          </a:p>
+          <a:p>
+            <a:pPr>
+              <a:buFont typeface="Arial" panose="020B0604020202020204" pitchFamily="34" charset="0"/>
+              <a:buChar char="•"/>
+            </a:pPr>
+            <a:r>
+              <a:rPr lang="en-US" sz="2100" dirty="0"/>
+              <a:t>  Dangers of using </a:t>
+            </a:r>
+            <a:r>
+              <a:rPr lang="en-US" sz="2100" dirty="0" err="1"/>
+              <a:t>dropna</a:t>
+            </a:r>
+            <a:r>
+              <a:rPr lang="en-US" sz="2100" dirty="0"/>
+              <a:t> </a:t>
+            </a:r>
+          </a:p>
+          <a:p>
+            <a:pPr marL="0" indent="0">
+              <a:buNone/>
+            </a:pPr>
+            <a:r>
+              <a:rPr lang="en-US" sz="2100" dirty="0"/>
+              <a:t>	With .</a:t>
+            </a:r>
+            <a:r>
+              <a:rPr lang="en-US" sz="2100" dirty="0" err="1"/>
+              <a:t>dropna</a:t>
+            </a:r>
+            <a:r>
+              <a:rPr lang="en-US" sz="2100" dirty="0"/>
+              <a:t>, deleted ~11,000 rows!</a:t>
+            </a:r>
+          </a:p>
+          <a:p>
+            <a:pPr marL="0" indent="0">
+              <a:buNone/>
+            </a:pPr>
+            <a:r>
+              <a:rPr lang="en-US" sz="2100" dirty="0"/>
+              <a:t>	Convert </a:t>
+            </a:r>
+            <a:r>
+              <a:rPr lang="en-US" sz="2100" dirty="0" err="1"/>
+              <a:t>NaN</a:t>
+            </a:r>
+            <a:r>
+              <a:rPr lang="en-US" sz="2100" dirty="0"/>
+              <a:t> to ‘0’ value instead.  </a:t>
+            </a:r>
+          </a:p>
+          <a:p>
+            <a:pPr>
+              <a:buFont typeface="Arial" panose="020B0604020202020204" pitchFamily="34" charset="0"/>
+              <a:buChar char="•"/>
+            </a:pPr>
+            <a:r>
+              <a:rPr lang="en-CA" sz="2100" dirty="0"/>
+              <a:t>  Snags with visualizing the data </a:t>
+            </a:r>
+          </a:p>
+          <a:p>
+            <a:br>
+              <a:rPr lang="en-US" b="1" dirty="0"/>
+            </a:br>
+            <a:r>
+              <a:rPr lang="en-US" b="1" dirty="0"/>
+              <a:t>Next Steps</a:t>
+            </a:r>
+          </a:p>
+          <a:p>
+            <a:pPr>
+              <a:buFont typeface="Arial" panose="020B0604020202020204" pitchFamily="34" charset="0"/>
+              <a:buChar char="•"/>
+            </a:pPr>
+            <a:r>
+              <a:rPr lang="en-CA" dirty="0"/>
+              <a:t>  How the number of degrees awarded effect the economy</a:t>
+            </a:r>
+          </a:p>
+          <a:p>
+            <a:pPr>
+              <a:buFont typeface="Arial" panose="020B0604020202020204" pitchFamily="34" charset="0"/>
+              <a:buChar char="•"/>
+            </a:pPr>
+            <a:r>
+              <a:rPr lang="en-CA" dirty="0"/>
+              <a:t>  Compare textbook sales to enrollment rates and total institution counts </a:t>
+            </a:r>
           </a:p>
         </p:txBody>
       </p:sp>
       <p:pic>
         <p:nvPicPr>
-          <p:cNvPr id="5" name="Content Placeholder 4">
+          <p:cNvPr id="7" name="Picture 6">
             <a:extLst>
               <a:ext uri="{FF2B5EF4-FFF2-40B4-BE49-F238E27FC236}">
-                <a16:creationId xmlns:a16="http://schemas.microsoft.com/office/drawing/2014/main" id="{FE831E26-1F82-473A-9ED1-7182E26AD258}"/>
+                <a16:creationId xmlns:a16="http://schemas.microsoft.com/office/drawing/2014/main" id="{A6EC3770-9CE8-4274-8FE5-102470E8F76E}"/>
               </a:ext>
             </a:extLst>
           </p:cNvPr>
           <p:cNvPicPr>
-            <a:picLocks noGrp="1" noChangeAspect="1"/>
+            <a:picLocks noChangeAspect="1"/>
           </p:cNvPicPr>
-          <p:nvPr>
-            <p:ph idx="1"/>
-          </p:nvPr>
+          <p:nvPr/>
         </p:nvPicPr>
         <p:blipFill>
-          <a:blip r:embed="rId2">
-            <a:extLst>
-              <a:ext uri="{28A0092B-C50C-407E-A947-70E740481C1C}">
-                <a14:useLocalDpi xmlns:a14="http://schemas.microsoft.com/office/drawing/2010/main" val="0"/>
-              </a:ext>
-            </a:extLst>
-          </a:blip>
+          <a:blip r:embed="rId2"/>
           <a:stretch>
             <a:fillRect/>
           </a:stretch>
         </p:blipFill>
         <p:spPr>
           <a:xfrm>
-            <a:off x="3458538" y="1971259"/>
-            <a:ext cx="5487650" cy="3658433"/>
+            <a:off x="5683568" y="2357437"/>
+            <a:ext cx="6000750" cy="2143125"/>
           </a:xfrm>
+          <a:prstGeom prst="rect">
+            <a:avLst/>
+          </a:prstGeom>
         </p:spPr>
       </p:pic>
     </p:spTree>
     <p:extLst>
       <p:ext uri="{BB962C8B-B14F-4D97-AF65-F5344CB8AC3E}">
-        <p14:creationId xmlns:p14="http://schemas.microsoft.com/office/powerpoint/2010/main" val="3338355388"/>
+        <p14:creationId xmlns:p14="http://schemas.microsoft.com/office/powerpoint/2010/main" val="2452138939"/>
       </p:ext>
     </p:extLst>
   </p:cSld>
@@ -5306,10 +7205,10 @@
       </p:grpSpPr>
       <p:pic>
         <p:nvPicPr>
-          <p:cNvPr id="5" name="Picture 4">
+          <p:cNvPr id="4" name="Content Placeholder 4">
             <a:extLst>
               <a:ext uri="{FF2B5EF4-FFF2-40B4-BE49-F238E27FC236}">
-                <a16:creationId xmlns:a16="http://schemas.microsoft.com/office/drawing/2014/main" id="{C7B93238-0630-4085-8B20-F2A420756893}"/>
+                <a16:creationId xmlns:a16="http://schemas.microsoft.com/office/drawing/2014/main" id="{2764CD58-ADB2-4D3E-9030-1773E51DEAD5}"/>
               </a:ext>
             </a:extLst>
           </p:cNvPr>
@@ -5332,7 +7231,7 @@
         </p:blipFill>
         <p:spPr>
           <a:xfrm>
-            <a:off x="6549605" y="1237957"/>
+            <a:off x="1564333" y="1812826"/>
             <a:ext cx="5487650" cy="3658433"/>
           </a:xfrm>
           <a:prstGeom prst="rect">
@@ -5340,56 +7239,12 @@
           </a:prstGeom>
         </p:spPr>
       </p:pic>
-      <p:sp>
-        <p:nvSpPr>
-          <p:cNvPr id="4" name="TextBox 3">
+      <p:pic>
+        <p:nvPicPr>
+          <p:cNvPr id="5" name="Picture 4">
             <a:extLst>
               <a:ext uri="{FF2B5EF4-FFF2-40B4-BE49-F238E27FC236}">
-                <a16:creationId xmlns:a16="http://schemas.microsoft.com/office/drawing/2014/main" id="{785F68BD-4309-4056-9E24-7CA3B46B34B7}"/>
-              </a:ext>
-            </a:extLst>
-          </p:cNvPr>
-          <p:cNvSpPr txBox="1"/>
-          <p:nvPr/>
-        </p:nvSpPr>
-        <p:spPr>
-          <a:xfrm>
-            <a:off x="100013" y="560289"/>
-            <a:ext cx="11937242" cy="381000"/>
-          </a:xfrm>
-          <a:prstGeom prst="rect">
-            <a:avLst/>
-          </a:prstGeom>
-          <a:noFill/>
-        </p:spPr>
-        <p:txBody>
-          <a:bodyPr wrap="square" rtlCol="0">
-            <a:spAutoFit/>
-          </a:bodyPr>
-          <a:lstStyle/>
-          <a:p>
-            <a:pPr algn="ctr"/>
-            <a:r>
-              <a:rPr lang="en-CA" b="1" dirty="0">
-                <a:latin typeface="Cambria" panose="02040503050406030204" pitchFamily="18" charset="0"/>
-              </a:rPr>
-              <a:t>I</a:t>
-            </a:r>
-            <a:r>
-              <a:rPr lang="en-US" b="1" dirty="0">
-                <a:latin typeface="Cambria" panose="02040503050406030204" pitchFamily="18" charset="0"/>
-              </a:rPr>
-              <a:t>PEDS Enrollment Data</a:t>
-            </a:r>
-          </a:p>
-        </p:txBody>
-      </p:sp>
-      <p:pic>
-        <p:nvPicPr>
-          <p:cNvPr id="6" name="Picture 5">
-            <a:extLst>
-              <a:ext uri="{FF2B5EF4-FFF2-40B4-BE49-F238E27FC236}">
-                <a16:creationId xmlns:a16="http://schemas.microsoft.com/office/drawing/2014/main" id="{723ADB0A-9ED1-45F2-8BED-45233C1532E6}"/>
+                <a16:creationId xmlns:a16="http://schemas.microsoft.com/office/drawing/2014/main" id="{078C9EFD-41D0-4DD8-9495-686400A49448}"/>
               </a:ext>
             </a:extLst>
           </p:cNvPr>
@@ -5398,7 +7253,7 @@
           </p:cNvPicPr>
           <p:nvPr/>
         </p:nvPicPr>
-        <p:blipFill>
+        <p:blipFill rotWithShape="1">
           <a:blip r:embed="rId3">
             <a:extLst>
               <a:ext uri="{28A0092B-C50C-407E-A947-70E740481C1C}">
@@ -5406,24 +7261,56 @@
               </a:ext>
             </a:extLst>
           </a:blip>
-          <a:stretch>
-            <a:fillRect/>
-          </a:stretch>
+          <a:srcRect l="82371"/>
+          <a:stretch/>
         </p:blipFill>
         <p:spPr>
           <a:xfrm>
-            <a:off x="723275" y="1237957"/>
-            <a:ext cx="5487650" cy="3658433"/>
+            <a:off x="9015413" y="1812826"/>
+            <a:ext cx="967412" cy="3658433"/>
           </a:xfrm>
           <a:prstGeom prst="rect">
             <a:avLst/>
           </a:prstGeom>
         </p:spPr>
       </p:pic>
+      <p:sp>
+        <p:nvSpPr>
+          <p:cNvPr id="6" name="Title 1">
+            <a:extLst>
+              <a:ext uri="{FF2B5EF4-FFF2-40B4-BE49-F238E27FC236}">
+                <a16:creationId xmlns:a16="http://schemas.microsoft.com/office/drawing/2014/main" id="{FEC6532F-8FD2-41DF-B217-B51EFFDA3B5A}"/>
+              </a:ext>
+            </a:extLst>
+          </p:cNvPr>
+          <p:cNvSpPr>
+            <a:spLocks noGrp="1"/>
+          </p:cNvSpPr>
+          <p:nvPr>
+            <p:ph type="title"/>
+          </p:nvPr>
+        </p:nvSpPr>
+        <p:spPr>
+          <a:xfrm>
+            <a:off x="1097280" y="286603"/>
+            <a:ext cx="10058400" cy="1450757"/>
+          </a:xfrm>
+        </p:spPr>
+        <p:txBody>
+          <a:bodyPr/>
+          <a:lstStyle/>
+          <a:p>
+            <a:r>
+              <a:rPr lang="en-US" dirty="0"/>
+              <a:t>Visualization troubles</a:t>
+            </a:r>
+          </a:p>
+        </p:txBody>
+      </p:sp>
     </p:spTree>
     <p:extLst>
       <p:ext uri="{BB962C8B-B14F-4D97-AF65-F5344CB8AC3E}">
-        <p14:creationId xmlns:p14="http://schemas.microsoft.com/office/powerpoint/2010/main" val="377206099"/>
+        <p14:creationId xmlns:p14="http://schemas.microsoft.com/office/powerpoint/2010/main" val="2212873854"/>
       </p:ext>
     </p:extLst>
   </p:cSld>
@@ -5473,275 +7360,8 @@
           <a:p>
             <a:r>
               <a:rPr lang="en-US" dirty="0"/>
-              <a:t>Discussion</a:t>
-            </a:r>
-          </a:p>
-        </p:txBody>
-      </p:sp>
-      <p:sp>
-        <p:nvSpPr>
-          <p:cNvPr id="3" name="Content Placeholder 2">
-            <a:extLst>
-              <a:ext uri="{FF2B5EF4-FFF2-40B4-BE49-F238E27FC236}">
-                <a16:creationId xmlns:a16="http://schemas.microsoft.com/office/drawing/2014/main" id="{30C4F1C1-804B-4A2E-836E-DCB09E48F49D}"/>
-              </a:ext>
-            </a:extLst>
-          </p:cNvPr>
-          <p:cNvSpPr>
-            <a:spLocks noGrp="1"/>
-          </p:cNvSpPr>
-          <p:nvPr>
-            <p:ph idx="1"/>
-          </p:nvPr>
-        </p:nvSpPr>
-        <p:spPr/>
-        <p:txBody>
-          <a:bodyPr/>
-          <a:lstStyle/>
-          <a:p>
-            <a:r>
-              <a:rPr lang="en-US" dirty="0"/>
-              <a:t>  * Discuss your findings. Did you find what you expected to find? If not, why not? What inferences or general conclusions can you draw from your analysis?</a:t>
-            </a:r>
-            <a:br>
-              <a:rPr lang="en-US" dirty="0"/>
-            </a:br>
-            <a:endParaRPr lang="en-US" dirty="0"/>
-          </a:p>
-          <a:p>
-            <a:endParaRPr lang="en-US" dirty="0"/>
-          </a:p>
-        </p:txBody>
-      </p:sp>
-      <p:pic>
-        <p:nvPicPr>
-          <p:cNvPr id="7" name="Picture 6">
-            <a:extLst>
-              <a:ext uri="{FF2B5EF4-FFF2-40B4-BE49-F238E27FC236}">
-                <a16:creationId xmlns:a16="http://schemas.microsoft.com/office/drawing/2014/main" id="{78EAF7B9-49C9-4F4E-B108-B4D430E37B8E}"/>
-              </a:ext>
-            </a:extLst>
-          </p:cNvPr>
-          <p:cNvPicPr>
-            <a:picLocks noChangeAspect="1"/>
-          </p:cNvPicPr>
-          <p:nvPr/>
-        </p:nvPicPr>
-        <p:blipFill>
-          <a:blip r:embed="rId2">
-            <a:extLst>
-              <a:ext uri="{28A0092B-C50C-407E-A947-70E740481C1C}">
-                <a14:useLocalDpi xmlns:a14="http://schemas.microsoft.com/office/drawing/2010/main" val="0"/>
-              </a:ext>
-            </a:extLst>
-          </a:blip>
-          <a:stretch>
-            <a:fillRect/>
-          </a:stretch>
-        </p:blipFill>
-        <p:spPr>
-          <a:xfrm>
-            <a:off x="2742575" y="2461174"/>
-            <a:ext cx="5487650" cy="3658433"/>
-          </a:xfrm>
-          <a:prstGeom prst="rect">
-            <a:avLst/>
-          </a:prstGeom>
-        </p:spPr>
-      </p:pic>
-    </p:spTree>
-    <p:extLst>
-      <p:ext uri="{BB962C8B-B14F-4D97-AF65-F5344CB8AC3E}">
-        <p14:creationId xmlns:p14="http://schemas.microsoft.com/office/powerpoint/2010/main" val="1047368940"/>
-      </p:ext>
-    </p:extLst>
-  </p:cSld>
-  <p:clrMapOvr>
-    <a:masterClrMapping/>
-  </p:clrMapOvr>
-</p:sld>
-</file>
-
-<file path=ppt/slides/slide15.xml><?xml version="1.0" encoding="utf-8"?>
-<p:sld xmlns:a="http://schemas.openxmlformats.org/drawingml/2006/main" xmlns:r="http://schemas.openxmlformats.org/officeDocument/2006/relationships" xmlns:p="http://schemas.openxmlformats.org/presentationml/2006/main">
-  <p:cSld>
-    <p:spTree>
-      <p:nvGrpSpPr>
-        <p:cNvPr id="1" name=""/>
-        <p:cNvGrpSpPr/>
-        <p:nvPr/>
-      </p:nvGrpSpPr>
-      <p:grpSpPr>
-        <a:xfrm>
-          <a:off x="0" y="0"/>
-          <a:ext cx="0" cy="0"/>
-          <a:chOff x="0" y="0"/>
-          <a:chExt cx="0" cy="0"/>
-        </a:xfrm>
-      </p:grpSpPr>
-      <p:sp>
-        <p:nvSpPr>
-          <p:cNvPr id="2" name="Title 1">
-            <a:extLst>
-              <a:ext uri="{FF2B5EF4-FFF2-40B4-BE49-F238E27FC236}">
-                <a16:creationId xmlns:a16="http://schemas.microsoft.com/office/drawing/2014/main" id="{0585AFDD-15A8-49BD-A991-AC342AB3A002}"/>
-              </a:ext>
-            </a:extLst>
-          </p:cNvPr>
-          <p:cNvSpPr>
-            <a:spLocks noGrp="1"/>
-          </p:cNvSpPr>
-          <p:nvPr>
-            <p:ph type="title"/>
-          </p:nvPr>
-        </p:nvSpPr>
-        <p:spPr/>
-        <p:txBody>
-          <a:bodyPr/>
-          <a:lstStyle/>
-          <a:p>
-            <a:r>
-              <a:rPr lang="en-US" dirty="0"/>
-              <a:t>Post Mortem</a:t>
-            </a:r>
-          </a:p>
-        </p:txBody>
-      </p:sp>
-      <p:sp>
-        <p:nvSpPr>
-          <p:cNvPr id="3" name="Content Placeholder 2">
-            <a:extLst>
-              <a:ext uri="{FF2B5EF4-FFF2-40B4-BE49-F238E27FC236}">
-                <a16:creationId xmlns:a16="http://schemas.microsoft.com/office/drawing/2014/main" id="{30C4F1C1-804B-4A2E-836E-DCB09E48F49D}"/>
-              </a:ext>
-            </a:extLst>
-          </p:cNvPr>
-          <p:cNvSpPr>
-            <a:spLocks noGrp="1"/>
-          </p:cNvSpPr>
-          <p:nvPr>
-            <p:ph idx="1"/>
-          </p:nvPr>
-        </p:nvSpPr>
-        <p:spPr/>
-        <p:txBody>
-          <a:bodyPr/>
-          <a:lstStyle/>
-          <a:p>
-            <a:br>
-              <a:rPr lang="en-US" dirty="0"/>
-            </a:br>
-            <a:r>
-              <a:rPr lang="en-US" dirty="0"/>
-              <a:t>  * Discuss any difficulties that arose, and how you dealt with them</a:t>
-            </a:r>
-            <a:br>
-              <a:rPr lang="en-US" dirty="0"/>
-            </a:br>
-            <a:r>
-              <a:rPr lang="en-US" dirty="0"/>
-              <a:t>  * Discuss any additional questions that came up, but which you didn't have time to answer: What would you research next, if you had two more weeks?</a:t>
-            </a:r>
-            <a:br>
-              <a:rPr lang="en-US" dirty="0"/>
-            </a:br>
-            <a:endParaRPr lang="en-US" dirty="0"/>
-          </a:p>
-          <a:p>
-            <a:endParaRPr lang="en-US" dirty="0"/>
-          </a:p>
-        </p:txBody>
-      </p:sp>
-    </p:spTree>
-    <p:extLst>
-      <p:ext uri="{BB962C8B-B14F-4D97-AF65-F5344CB8AC3E}">
-        <p14:creationId xmlns:p14="http://schemas.microsoft.com/office/powerpoint/2010/main" val="2452138939"/>
-      </p:ext>
-    </p:extLst>
-  </p:cSld>
-  <p:clrMapOvr>
-    <a:masterClrMapping/>
-  </p:clrMapOvr>
-</p:sld>
-</file>
-
-<file path=ppt/slides/slide16.xml><?xml version="1.0" encoding="utf-8"?>
-<p:sld xmlns:a="http://schemas.openxmlformats.org/drawingml/2006/main" xmlns:r="http://schemas.openxmlformats.org/officeDocument/2006/relationships" xmlns:p="http://schemas.openxmlformats.org/presentationml/2006/main">
-  <p:cSld>
-    <p:spTree>
-      <p:nvGrpSpPr>
-        <p:cNvPr id="1" name=""/>
-        <p:cNvGrpSpPr/>
-        <p:nvPr/>
-      </p:nvGrpSpPr>
-      <p:grpSpPr>
-        <a:xfrm>
-          <a:off x="0" y="0"/>
-          <a:ext cx="0" cy="0"/>
-          <a:chOff x="0" y="0"/>
-          <a:chExt cx="0" cy="0"/>
-        </a:xfrm>
-      </p:grpSpPr>
-      <p:sp>
-        <p:nvSpPr>
-          <p:cNvPr id="2" name="Title 1">
-            <a:extLst>
-              <a:ext uri="{FF2B5EF4-FFF2-40B4-BE49-F238E27FC236}">
-                <a16:creationId xmlns:a16="http://schemas.microsoft.com/office/drawing/2014/main" id="{0585AFDD-15A8-49BD-A991-AC342AB3A002}"/>
-              </a:ext>
-            </a:extLst>
-          </p:cNvPr>
-          <p:cNvSpPr>
-            <a:spLocks noGrp="1"/>
-          </p:cNvSpPr>
-          <p:nvPr>
-            <p:ph type="title"/>
-          </p:nvPr>
-        </p:nvSpPr>
-        <p:spPr/>
-        <p:txBody>
-          <a:bodyPr/>
-          <a:lstStyle/>
-          <a:p>
-            <a:r>
-              <a:rPr lang="en-US" dirty="0"/>
-              <a:t>Questions</a:t>
-            </a:r>
-          </a:p>
-        </p:txBody>
-      </p:sp>
-      <p:sp>
-        <p:nvSpPr>
-          <p:cNvPr id="3" name="Content Placeholder 2">
-            <a:extLst>
-              <a:ext uri="{FF2B5EF4-FFF2-40B4-BE49-F238E27FC236}">
-                <a16:creationId xmlns:a16="http://schemas.microsoft.com/office/drawing/2014/main" id="{30C4F1C1-804B-4A2E-836E-DCB09E48F49D}"/>
-              </a:ext>
-            </a:extLst>
-          </p:cNvPr>
-          <p:cNvSpPr>
-            <a:spLocks noGrp="1"/>
-          </p:cNvSpPr>
-          <p:nvPr>
-            <p:ph idx="1"/>
-          </p:nvPr>
-        </p:nvSpPr>
-        <p:spPr/>
-        <p:txBody>
-          <a:bodyPr/>
-          <a:lstStyle/>
-          <a:p>
-            <a:r>
-              <a:rPr lang="en-US" dirty="0"/>
-              <a:t>  * Open-floor Q&amp;A with the audience</a:t>
-            </a:r>
-            <a:br>
-              <a:rPr lang="en-US" dirty="0"/>
-            </a:br>
-            <a:endParaRPr lang="en-US" dirty="0"/>
-          </a:p>
-          <a:p>
-            <a:endParaRPr lang="en-US" dirty="0"/>
+              <a:t>Questions?</a:t>
+            </a:r>
           </a:p>
         </p:txBody>
       </p:sp>
@@ -6305,7 +7925,7 @@
             </a:pPr>
             <a:r>
               <a:rPr lang="en-US" dirty="0"/>
-              <a:t> Many different ways to pinpoint your data needs</a:t>
+              <a:t> Many different ways to pinpoint your data needs (Custom data files)</a:t>
             </a:r>
           </a:p>
           <a:p>
@@ -6514,6 +8134,321 @@
 </file>
 
 <file path=ppt/slides/slide5.xml><?xml version="1.0" encoding="utf-8"?>
+<p:sld xmlns:a="http://schemas.openxmlformats.org/drawingml/2006/main" xmlns:r="http://schemas.openxmlformats.org/officeDocument/2006/relationships" xmlns:p="http://schemas.openxmlformats.org/presentationml/2006/main">
+  <p:cSld>
+    <p:spTree>
+      <p:nvGrpSpPr>
+        <p:cNvPr id="1" name=""/>
+        <p:cNvGrpSpPr/>
+        <p:nvPr/>
+      </p:nvGrpSpPr>
+      <p:grpSpPr>
+        <a:xfrm>
+          <a:off x="0" y="0"/>
+          <a:ext cx="0" cy="0"/>
+          <a:chOff x="0" y="0"/>
+          <a:chExt cx="0" cy="0"/>
+        </a:xfrm>
+      </p:grpSpPr>
+      <p:sp>
+        <p:nvSpPr>
+          <p:cNvPr id="2" name="Title 1">
+            <a:extLst>
+              <a:ext uri="{FF2B5EF4-FFF2-40B4-BE49-F238E27FC236}">
+                <a16:creationId xmlns:a16="http://schemas.microsoft.com/office/drawing/2014/main" id="{0585AFDD-15A8-49BD-A991-AC342AB3A002}"/>
+              </a:ext>
+            </a:extLst>
+          </p:cNvPr>
+          <p:cNvSpPr>
+            <a:spLocks noGrp="1"/>
+          </p:cNvSpPr>
+          <p:nvPr>
+            <p:ph type="title"/>
+          </p:nvPr>
+        </p:nvSpPr>
+        <p:spPr/>
+        <p:txBody>
+          <a:bodyPr>
+            <a:normAutofit/>
+          </a:bodyPr>
+          <a:lstStyle/>
+          <a:p>
+            <a:r>
+              <a:rPr lang="en-US" dirty="0"/>
+              <a:t>Data Cleanup &amp; Exploration - FRED</a:t>
+            </a:r>
+          </a:p>
+        </p:txBody>
+      </p:sp>
+      <p:sp>
+        <p:nvSpPr>
+          <p:cNvPr id="3" name="Content Placeholder 2">
+            <a:extLst>
+              <a:ext uri="{FF2B5EF4-FFF2-40B4-BE49-F238E27FC236}">
+                <a16:creationId xmlns:a16="http://schemas.microsoft.com/office/drawing/2014/main" id="{30C4F1C1-804B-4A2E-836E-DCB09E48F49D}"/>
+              </a:ext>
+            </a:extLst>
+          </p:cNvPr>
+          <p:cNvSpPr>
+            <a:spLocks noGrp="1"/>
+          </p:cNvSpPr>
+          <p:nvPr>
+            <p:ph idx="1"/>
+          </p:nvPr>
+        </p:nvSpPr>
+        <p:spPr>
+          <a:xfrm>
+            <a:off x="1097280" y="1845734"/>
+            <a:ext cx="4521642" cy="4023360"/>
+          </a:xfrm>
+        </p:spPr>
+        <p:txBody>
+          <a:bodyPr>
+            <a:normAutofit fontScale="70000" lnSpcReduction="20000"/>
+          </a:bodyPr>
+          <a:lstStyle/>
+          <a:p>
+            <a:pPr marL="0" indent="0">
+              <a:buNone/>
+            </a:pPr>
+            <a:r>
+              <a:rPr lang="en-US" b="1" dirty="0"/>
+              <a:t>FRED Exploration</a:t>
+            </a:r>
+          </a:p>
+          <a:p>
+            <a:pPr>
+              <a:buFont typeface="Arial" panose="020B0604020202020204" pitchFamily="34" charset="0"/>
+              <a:buChar char="•"/>
+            </a:pPr>
+            <a:r>
+              <a:rPr lang="en-US" dirty="0"/>
+              <a:t> Economic data</a:t>
+            </a:r>
+          </a:p>
+          <a:p>
+            <a:pPr>
+              <a:buFont typeface="Arial" panose="020B0604020202020204" pitchFamily="34" charset="0"/>
+              <a:buChar char="•"/>
+            </a:pPr>
+            <a:r>
+              <a:rPr lang="en-US" dirty="0"/>
+              <a:t> &gt;500k data series</a:t>
+            </a:r>
+          </a:p>
+          <a:p>
+            <a:pPr marL="0" indent="0">
+              <a:buNone/>
+            </a:pPr>
+            <a:r>
+              <a:rPr lang="en-CA" b="1" dirty="0"/>
+              <a:t>FRED Data Files Obtained</a:t>
+            </a:r>
+          </a:p>
+          <a:p>
+            <a:pPr>
+              <a:buFont typeface="Arial" panose="020B0604020202020204" pitchFamily="34" charset="0"/>
+              <a:buChar char="•"/>
+            </a:pPr>
+            <a:r>
+              <a:rPr lang="en-CA" dirty="0"/>
+              <a:t> Monthly unemployment (2000-2018)</a:t>
+            </a:r>
+          </a:p>
+          <a:p>
+            <a:pPr>
+              <a:buFont typeface="Arial" panose="020B0604020202020204" pitchFamily="34" charset="0"/>
+              <a:buChar char="•"/>
+            </a:pPr>
+            <a:r>
+              <a:rPr lang="en-CA" dirty="0"/>
+              <a:t> Monthly labor force participation (2000-2018)</a:t>
+            </a:r>
+          </a:p>
+          <a:p>
+            <a:pPr>
+              <a:buFont typeface="Arial" panose="020B0604020202020204" pitchFamily="34" charset="0"/>
+              <a:buChar char="•"/>
+            </a:pPr>
+            <a:r>
+              <a:rPr lang="en-CA" dirty="0"/>
+              <a:t> Weekly unemployment claims (2000-2018)</a:t>
+            </a:r>
+          </a:p>
+          <a:p>
+            <a:pPr marL="0" indent="0">
+              <a:buNone/>
+            </a:pPr>
+            <a:r>
+              <a:rPr lang="en-CA" b="1" dirty="0"/>
+              <a:t>Cleanup</a:t>
+            </a:r>
+          </a:p>
+          <a:p>
+            <a:pPr>
+              <a:buFont typeface="Arial" panose="020B0604020202020204" pitchFamily="34" charset="0"/>
+              <a:buChar char="•"/>
+            </a:pPr>
+            <a:r>
+              <a:rPr lang="en-CA" dirty="0"/>
+              <a:t>  Removed extraneous columns</a:t>
+            </a:r>
+          </a:p>
+          <a:p>
+            <a:pPr>
+              <a:buFont typeface="Arial" panose="020B0604020202020204" pitchFamily="34" charset="0"/>
+              <a:buChar char="•"/>
+            </a:pPr>
+            <a:r>
+              <a:rPr lang="en-CA" dirty="0"/>
+              <a:t>  Averaged data annually to match NCES data</a:t>
+            </a:r>
+          </a:p>
+          <a:p>
+            <a:pPr marL="0" indent="0">
+              <a:buNone/>
+            </a:pPr>
+            <a:r>
+              <a:rPr lang="en-CA" b="1" dirty="0"/>
+              <a:t>Problems</a:t>
+            </a:r>
+          </a:p>
+          <a:p>
+            <a:pPr>
+              <a:buFont typeface="Arial" panose="020B0604020202020204" pitchFamily="34" charset="0"/>
+              <a:buChar char="•"/>
+            </a:pPr>
+            <a:r>
+              <a:rPr lang="en-US" dirty="0"/>
+              <a:t> Different frequency of observations than NCES data</a:t>
+            </a:r>
+            <a:br>
+              <a:rPr lang="en-US" dirty="0"/>
+            </a:br>
+            <a:endParaRPr lang="en-US" dirty="0"/>
+          </a:p>
+          <a:p>
+            <a:endParaRPr lang="en-US" dirty="0"/>
+          </a:p>
+        </p:txBody>
+      </p:sp>
+      <p:grpSp>
+        <p:nvGrpSpPr>
+          <p:cNvPr id="8" name="Group 7">
+            <a:extLst>
+              <a:ext uri="{FF2B5EF4-FFF2-40B4-BE49-F238E27FC236}">
+                <a16:creationId xmlns:a16="http://schemas.microsoft.com/office/drawing/2014/main" id="{E902432B-616D-4CD6-B96C-83FFFF217B28}"/>
+              </a:ext>
+            </a:extLst>
+          </p:cNvPr>
+          <p:cNvGrpSpPr/>
+          <p:nvPr/>
+        </p:nvGrpSpPr>
+        <p:grpSpPr>
+          <a:xfrm>
+            <a:off x="4887402" y="1896178"/>
+            <a:ext cx="7165929" cy="3224463"/>
+            <a:chOff x="4887402" y="1896178"/>
+            <a:chExt cx="7165929" cy="3224463"/>
+          </a:xfrm>
+        </p:grpSpPr>
+        <p:pic>
+          <p:nvPicPr>
+            <p:cNvPr id="6" name="Picture 5">
+              <a:extLst>
+                <a:ext uri="{FF2B5EF4-FFF2-40B4-BE49-F238E27FC236}">
+                  <a16:creationId xmlns:a16="http://schemas.microsoft.com/office/drawing/2014/main" id="{07C5A5F7-5BDA-48BF-AF6E-7F3B84B0F391}"/>
+                </a:ext>
+              </a:extLst>
+            </p:cNvPr>
+            <p:cNvPicPr>
+              <a:picLocks noChangeAspect="1"/>
+            </p:cNvPicPr>
+            <p:nvPr/>
+          </p:nvPicPr>
+          <p:blipFill>
+            <a:blip r:embed="rId3"/>
+            <a:stretch>
+              <a:fillRect/>
+            </a:stretch>
+          </p:blipFill>
+          <p:spPr>
+            <a:xfrm>
+              <a:off x="4887402" y="1896178"/>
+              <a:ext cx="7165929" cy="3224463"/>
+            </a:xfrm>
+            <a:prstGeom prst="rect">
+              <a:avLst/>
+            </a:prstGeom>
+          </p:spPr>
+        </p:pic>
+        <p:sp>
+          <p:nvSpPr>
+            <p:cNvPr id="7" name="Rectangle: Rounded Corners 6">
+              <a:extLst>
+                <a:ext uri="{FF2B5EF4-FFF2-40B4-BE49-F238E27FC236}">
+                  <a16:creationId xmlns:a16="http://schemas.microsoft.com/office/drawing/2014/main" id="{C4E1CF56-E7F1-403F-8E85-28B001037279}"/>
+                </a:ext>
+              </a:extLst>
+            </p:cNvPr>
+            <p:cNvSpPr/>
+            <p:nvPr/>
+          </p:nvSpPr>
+          <p:spPr>
+            <a:xfrm>
+              <a:off x="11360313" y="1934678"/>
+              <a:ext cx="673768" cy="308009"/>
+            </a:xfrm>
+            <a:prstGeom prst="roundRect">
+              <a:avLst/>
+            </a:prstGeom>
+            <a:noFill/>
+            <a:ln w="38100">
+              <a:solidFill>
+                <a:srgbClr val="00B050"/>
+              </a:solidFill>
+            </a:ln>
+          </p:spPr>
+          <p:style>
+            <a:lnRef idx="2">
+              <a:schemeClr val="accent1">
+                <a:shade val="50000"/>
+              </a:schemeClr>
+            </a:lnRef>
+            <a:fillRef idx="1">
+              <a:schemeClr val="accent1"/>
+            </a:fillRef>
+            <a:effectRef idx="0">
+              <a:schemeClr val="accent1"/>
+            </a:effectRef>
+            <a:fontRef idx="minor">
+              <a:schemeClr val="lt1"/>
+            </a:fontRef>
+          </p:style>
+          <p:txBody>
+            <a:bodyPr rtlCol="0" anchor="ctr"/>
+            <a:lstStyle/>
+            <a:p>
+              <a:pPr algn="ctr"/>
+              <a:endParaRPr lang="en-US" dirty="0"/>
+            </a:p>
+          </p:txBody>
+        </p:sp>
+      </p:grpSp>
+    </p:spTree>
+    <p:extLst>
+      <p:ext uri="{BB962C8B-B14F-4D97-AF65-F5344CB8AC3E}">
+        <p14:creationId xmlns:p14="http://schemas.microsoft.com/office/powerpoint/2010/main" val="4036851302"/>
+      </p:ext>
+    </p:extLst>
+  </p:cSld>
+  <p:clrMapOvr>
+    <a:masterClrMapping/>
+  </p:clrMapOvr>
+</p:sld>
+</file>
+
+<file path=ppt/slides/slide6.xml><?xml version="1.0" encoding="utf-8"?>
 <p:sld xmlns:a="http://schemas.openxmlformats.org/drawingml/2006/main" xmlns:r="http://schemas.openxmlformats.org/officeDocument/2006/relationships" xmlns:p="http://schemas.openxmlformats.org/presentationml/2006/main">
   <p:cSld>
     <p:spTree>
@@ -6939,7 +8874,7 @@
 </p:sld>
 </file>
 
-<file path=ppt/slides/slide6.xml><?xml version="1.0" encoding="utf-8"?>
+<file path=ppt/slides/slide7.xml><?xml version="1.0" encoding="utf-8"?>
 <p:sld xmlns:a="http://schemas.openxmlformats.org/drawingml/2006/main" xmlns:r="http://schemas.openxmlformats.org/officeDocument/2006/relationships" xmlns:p="http://schemas.openxmlformats.org/presentationml/2006/main">
   <p:cSld>
     <p:spTree>
@@ -6958,10 +8893,10 @@
       </p:grpSpPr>
       <p:pic>
         <p:nvPicPr>
-          <p:cNvPr id="3" name="Picture 2">
+          <p:cNvPr id="4" name="Picture 3">
             <a:extLst>
               <a:ext uri="{FF2B5EF4-FFF2-40B4-BE49-F238E27FC236}">
-                <a16:creationId xmlns:a16="http://schemas.microsoft.com/office/drawing/2014/main" id="{47C9C1F8-0E05-4ED2-BF3F-4DAEE444977B}"/>
+                <a16:creationId xmlns:a16="http://schemas.microsoft.com/office/drawing/2014/main" id="{699430E1-CD46-45E2-BB40-F1AE6BD1C552}"/>
               </a:ext>
             </a:extLst>
           </p:cNvPr>
@@ -6984,7 +8919,7 @@
         </p:blipFill>
         <p:spPr>
           <a:xfrm>
-            <a:off x="6545540" y="0"/>
+            <a:off x="408950" y="1428333"/>
             <a:ext cx="5487650" cy="3658433"/>
           </a:xfrm>
           <a:prstGeom prst="rect">
@@ -6994,10 +8929,10 @@
       </p:pic>
       <p:pic>
         <p:nvPicPr>
-          <p:cNvPr id="11" name="Picture 10">
+          <p:cNvPr id="6" name="Picture 5">
             <a:extLst>
               <a:ext uri="{FF2B5EF4-FFF2-40B4-BE49-F238E27FC236}">
-                <a16:creationId xmlns:a16="http://schemas.microsoft.com/office/drawing/2014/main" id="{F32AAAB6-053C-4635-8192-BE43E372860F}"/>
+                <a16:creationId xmlns:a16="http://schemas.microsoft.com/office/drawing/2014/main" id="{39694BFB-E091-468C-BD79-6C06B472A40C}"/>
               </a:ext>
             </a:extLst>
           </p:cNvPr>
@@ -7020,7 +8955,7 @@
         </p:blipFill>
         <p:spPr>
           <a:xfrm>
-            <a:off x="0" y="0"/>
+            <a:off x="6096000" y="1428332"/>
             <a:ext cx="5487650" cy="3658433"/>
           </a:xfrm>
           <a:prstGeom prst="rect">
@@ -7028,238 +8963,54 @@
           </a:prstGeom>
         </p:spPr>
       </p:pic>
-      <p:pic>
-        <p:nvPicPr>
-          <p:cNvPr id="18" name="Picture 17">
+      <p:sp>
+        <p:nvSpPr>
+          <p:cNvPr id="9" name="TextBox 8">
             <a:extLst>
               <a:ext uri="{FF2B5EF4-FFF2-40B4-BE49-F238E27FC236}">
-                <a16:creationId xmlns:a16="http://schemas.microsoft.com/office/drawing/2014/main" id="{FFB9865B-D38E-4243-A2AE-F62A13CDF44C}"/>
+                <a16:creationId xmlns:a16="http://schemas.microsoft.com/office/drawing/2014/main" id="{B4BDA540-93AB-4648-94D7-E71A934C986B}"/>
               </a:ext>
             </a:extLst>
           </p:cNvPr>
-          <p:cNvPicPr>
-            <a:picLocks noChangeAspect="1"/>
-          </p:cNvPicPr>
+          <p:cNvSpPr txBox="1"/>
           <p:nvPr/>
-        </p:nvPicPr>
-        <p:blipFill>
-          <a:blip r:embed="rId4">
-            <a:extLst>
-              <a:ext uri="{28A0092B-C50C-407E-A947-70E740481C1C}">
-                <a14:useLocalDpi xmlns:a14="http://schemas.microsoft.com/office/drawing/2010/main" val="0"/>
-              </a:ext>
-            </a:extLst>
-          </a:blip>
-          <a:stretch>
-            <a:fillRect/>
-          </a:stretch>
-        </p:blipFill>
+        </p:nvSpPr>
         <p:spPr>
           <a:xfrm>
-            <a:off x="3352175" y="3513039"/>
-            <a:ext cx="5060305" cy="3373536"/>
+            <a:off x="100013" y="560289"/>
+            <a:ext cx="11937242" cy="381000"/>
           </a:xfrm>
           <a:prstGeom prst="rect">
             <a:avLst/>
           </a:prstGeom>
+          <a:noFill/>
         </p:spPr>
-      </p:pic>
+        <p:txBody>
+          <a:bodyPr wrap="square" rtlCol="0">
+            <a:spAutoFit/>
+          </a:bodyPr>
+          <a:lstStyle/>
+          <a:p>
+            <a:pPr algn="ctr"/>
+            <a:r>
+              <a:rPr lang="en-CA" b="1" dirty="0">
+                <a:latin typeface="Cambria" panose="02040503050406030204" pitchFamily="18" charset="0"/>
+              </a:rPr>
+              <a:t>Unemployment </a:t>
+            </a:r>
+            <a:r>
+              <a:rPr lang="en-US" b="1" dirty="0">
+                <a:latin typeface="Cambria" panose="02040503050406030204" pitchFamily="18" charset="0"/>
+              </a:rPr>
+              <a:t>Data</a:t>
+            </a:r>
+          </a:p>
+        </p:txBody>
+      </p:sp>
     </p:spTree>
     <p:extLst>
       <p:ext uri="{BB962C8B-B14F-4D97-AF65-F5344CB8AC3E}">
         <p14:creationId xmlns:p14="http://schemas.microsoft.com/office/powerpoint/2010/main" val="3404983984"/>
-      </p:ext>
-    </p:extLst>
-  </p:cSld>
-  <p:clrMapOvr>
-    <a:masterClrMapping/>
-  </p:clrMapOvr>
-</p:sld>
-</file>
-
-<file path=ppt/slides/slide7.xml><?xml version="1.0" encoding="utf-8"?>
-<p:sld xmlns:a="http://schemas.openxmlformats.org/drawingml/2006/main" xmlns:r="http://schemas.openxmlformats.org/officeDocument/2006/relationships" xmlns:p="http://schemas.openxmlformats.org/presentationml/2006/main">
-  <p:cSld>
-    <p:spTree>
-      <p:nvGrpSpPr>
-        <p:cNvPr id="1" name=""/>
-        <p:cNvGrpSpPr/>
-        <p:nvPr/>
-      </p:nvGrpSpPr>
-      <p:grpSpPr>
-        <a:xfrm>
-          <a:off x="0" y="0"/>
-          <a:ext cx="0" cy="0"/>
-          <a:chOff x="0" y="0"/>
-          <a:chExt cx="0" cy="0"/>
-        </a:xfrm>
-      </p:grpSpPr>
-      <p:sp>
-        <p:nvSpPr>
-          <p:cNvPr id="2" name="Title 1">
-            <a:extLst>
-              <a:ext uri="{FF2B5EF4-FFF2-40B4-BE49-F238E27FC236}">
-                <a16:creationId xmlns:a16="http://schemas.microsoft.com/office/drawing/2014/main" id="{8B431CD7-229E-485E-8E5B-F4DC0D5D999D}"/>
-              </a:ext>
-            </a:extLst>
-          </p:cNvPr>
-          <p:cNvSpPr>
-            <a:spLocks noGrp="1"/>
-          </p:cNvSpPr>
-          <p:nvPr>
-            <p:ph type="title"/>
-          </p:nvPr>
-        </p:nvSpPr>
-        <p:spPr/>
-        <p:txBody>
-          <a:bodyPr>
-            <a:normAutofit/>
-          </a:bodyPr>
-          <a:lstStyle/>
-          <a:p>
-            <a:r>
-              <a:rPr lang="en-US" sz="2000" b="1" dirty="0">
-                <a:latin typeface="Cambria" panose="02040503050406030204" pitchFamily="18" charset="0"/>
-              </a:rPr>
-              <a:t>Degree Completion</a:t>
-            </a:r>
-          </a:p>
-        </p:txBody>
-      </p:sp>
-      <p:sp>
-        <p:nvSpPr>
-          <p:cNvPr id="3" name="Content Placeholder 2">
-            <a:extLst>
-              <a:ext uri="{FF2B5EF4-FFF2-40B4-BE49-F238E27FC236}">
-                <a16:creationId xmlns:a16="http://schemas.microsoft.com/office/drawing/2014/main" id="{61DD7223-6C09-4C88-898E-7D659E0A2AB4}"/>
-              </a:ext>
-            </a:extLst>
-          </p:cNvPr>
-          <p:cNvSpPr>
-            <a:spLocks noGrp="1"/>
-          </p:cNvSpPr>
-          <p:nvPr>
-            <p:ph idx="1"/>
-          </p:nvPr>
-        </p:nvSpPr>
-        <p:spPr>
-          <a:xfrm>
-            <a:off x="1097280" y="1845734"/>
-            <a:ext cx="10058400" cy="4023360"/>
-          </a:xfrm>
-        </p:spPr>
-        <p:txBody>
-          <a:bodyPr/>
-          <a:lstStyle/>
-          <a:p>
-            <a:r>
-              <a:rPr lang="en-US" dirty="0">
-                <a:latin typeface="Cambria" panose="02040503050406030204" pitchFamily="18" charset="0"/>
-              </a:rPr>
-              <a:t>Degree Completion data contains data for FOUR Degree Types from 2,544 institution (2005-2017):</a:t>
-            </a:r>
-          </a:p>
-          <a:p>
-            <a:endParaRPr lang="en-US" dirty="0">
-              <a:latin typeface="Cambria" panose="02040503050406030204" pitchFamily="18" charset="0"/>
-            </a:endParaRPr>
-          </a:p>
-          <a:p>
-            <a:pPr>
-              <a:buFont typeface="Wingdings" panose="05000000000000000000" pitchFamily="2" charset="2"/>
-              <a:buChar char="Ø"/>
-            </a:pPr>
-            <a:r>
-              <a:rPr lang="en-US" dirty="0">
-                <a:latin typeface="Cambria" panose="02040503050406030204" pitchFamily="18" charset="0"/>
-              </a:rPr>
-              <a:t> One year certification</a:t>
-            </a:r>
-          </a:p>
-          <a:p>
-            <a:pPr>
-              <a:buFont typeface="Wingdings" panose="05000000000000000000" pitchFamily="2" charset="2"/>
-              <a:buChar char="Ø"/>
-            </a:pPr>
-            <a:r>
-              <a:rPr lang="en-US" dirty="0">
-                <a:latin typeface="Cambria" panose="02040503050406030204" pitchFamily="18" charset="0"/>
-              </a:rPr>
-              <a:t>Two year certification</a:t>
-            </a:r>
-          </a:p>
-          <a:p>
-            <a:pPr>
-              <a:buFont typeface="Wingdings" panose="05000000000000000000" pitchFamily="2" charset="2"/>
-              <a:buChar char="Ø"/>
-            </a:pPr>
-            <a:r>
-              <a:rPr lang="en-US" dirty="0">
-                <a:latin typeface="Cambria" panose="02040503050406030204" pitchFamily="18" charset="0"/>
-              </a:rPr>
-              <a:t>Associates Degree</a:t>
-            </a:r>
-          </a:p>
-          <a:p>
-            <a:pPr>
-              <a:buFont typeface="Wingdings" panose="05000000000000000000" pitchFamily="2" charset="2"/>
-              <a:buChar char="Ø"/>
-            </a:pPr>
-            <a:r>
-              <a:rPr lang="en-US" dirty="0">
-                <a:latin typeface="Cambria" panose="02040503050406030204" pitchFamily="18" charset="0"/>
-              </a:rPr>
-              <a:t>Bachelor’s Degree</a:t>
-            </a:r>
-          </a:p>
-          <a:p>
-            <a:pPr marL="0" indent="0">
-              <a:buNone/>
-            </a:pPr>
-            <a:endParaRPr lang="en-US" dirty="0"/>
-          </a:p>
-        </p:txBody>
-      </p:sp>
-      <p:pic>
-        <p:nvPicPr>
-          <p:cNvPr id="5" name="Picture 4">
-            <a:extLst>
-              <a:ext uri="{FF2B5EF4-FFF2-40B4-BE49-F238E27FC236}">
-                <a16:creationId xmlns:a16="http://schemas.microsoft.com/office/drawing/2014/main" id="{932F80A0-AEDC-4231-8B34-201CD8644B11}"/>
-              </a:ext>
-            </a:extLst>
-          </p:cNvPr>
-          <p:cNvPicPr>
-            <a:picLocks noChangeAspect="1"/>
-          </p:cNvPicPr>
-          <p:nvPr/>
-        </p:nvPicPr>
-        <p:blipFill>
-          <a:blip r:embed="rId3">
-            <a:extLst>
-              <a:ext uri="{28A0092B-C50C-407E-A947-70E740481C1C}">
-                <a14:useLocalDpi xmlns:a14="http://schemas.microsoft.com/office/drawing/2010/main" val="0"/>
-              </a:ext>
-            </a:extLst>
-          </a:blip>
-          <a:stretch>
-            <a:fillRect/>
-          </a:stretch>
-        </p:blipFill>
-        <p:spPr>
-          <a:xfrm>
-            <a:off x="4942435" y="2210661"/>
-            <a:ext cx="5487650" cy="3658433"/>
-          </a:xfrm>
-          <a:prstGeom prst="rect">
-            <a:avLst/>
-          </a:prstGeom>
-        </p:spPr>
-      </p:pic>
-    </p:spTree>
-    <p:extLst>
-      <p:ext uri="{BB962C8B-B14F-4D97-AF65-F5344CB8AC3E}">
-        <p14:creationId xmlns:p14="http://schemas.microsoft.com/office/powerpoint/2010/main" val="3000175066"/>
       </p:ext>
     </p:extLst>
   </p:cSld>
@@ -7286,194 +9037,120 @@
           <a:chExt cx="0" cy="0"/>
         </a:xfrm>
       </p:grpSpPr>
-      <p:sp>
-        <p:nvSpPr>
-          <p:cNvPr id="2" name="Title 1">
+      <p:pic>
+        <p:nvPicPr>
+          <p:cNvPr id="5" name="Picture 4">
             <a:extLst>
               <a:ext uri="{FF2B5EF4-FFF2-40B4-BE49-F238E27FC236}">
-                <a16:creationId xmlns:a16="http://schemas.microsoft.com/office/drawing/2014/main" id="{623CD2EB-58B2-4C16-84A3-5C82C89FA2F1}"/>
+                <a16:creationId xmlns:a16="http://schemas.microsoft.com/office/drawing/2014/main" id="{C7B93238-0630-4085-8B20-F2A420756893}"/>
               </a:ext>
             </a:extLst>
           </p:cNvPr>
-          <p:cNvSpPr>
-            <a:spLocks noGrp="1"/>
-          </p:cNvSpPr>
-          <p:nvPr>
-            <p:ph type="title"/>
-          </p:nvPr>
-        </p:nvSpPr>
-        <p:spPr/>
-        <p:txBody>
-          <a:bodyPr>
-            <a:normAutofit/>
-          </a:bodyPr>
-          <a:lstStyle/>
-          <a:p>
-            <a:r>
-              <a:rPr lang="en-US" sz="2000" b="1" dirty="0">
-                <a:latin typeface="Cambria" panose="02040503050406030204" pitchFamily="18" charset="0"/>
-              </a:rPr>
-              <a:t>Data Frame was processed with</a:t>
-            </a:r>
-          </a:p>
-        </p:txBody>
-      </p:sp>
-      <p:sp>
-        <p:nvSpPr>
-          <p:cNvPr id="3" name="Content Placeholder 2">
+          <p:cNvPicPr>
+            <a:picLocks noChangeAspect="1"/>
+          </p:cNvPicPr>
+          <p:nvPr/>
+        </p:nvPicPr>
+        <p:blipFill>
+          <a:blip r:embed="rId2">
+            <a:extLst>
+              <a:ext uri="{28A0092B-C50C-407E-A947-70E740481C1C}">
+                <a14:useLocalDpi xmlns:a14="http://schemas.microsoft.com/office/drawing/2010/main" val="0"/>
+              </a:ext>
+            </a:extLst>
+          </a:blip>
+          <a:stretch>
+            <a:fillRect/>
+          </a:stretch>
+        </p:blipFill>
+        <p:spPr>
+          <a:xfrm>
+            <a:off x="6549605" y="1237957"/>
+            <a:ext cx="5487650" cy="3658433"/>
+          </a:xfrm>
+          <a:prstGeom prst="rect">
+            <a:avLst/>
+          </a:prstGeom>
+        </p:spPr>
+      </p:pic>
+      <p:sp>
+        <p:nvSpPr>
+          <p:cNvPr id="4" name="TextBox 3">
             <a:extLst>
               <a:ext uri="{FF2B5EF4-FFF2-40B4-BE49-F238E27FC236}">
-                <a16:creationId xmlns:a16="http://schemas.microsoft.com/office/drawing/2014/main" id="{D5B2E07C-CDA9-44D1-A3CB-5AC16453E42B}"/>
+                <a16:creationId xmlns:a16="http://schemas.microsoft.com/office/drawing/2014/main" id="{785F68BD-4309-4056-9E24-7CA3B46B34B7}"/>
               </a:ext>
             </a:extLst>
           </p:cNvPr>
-          <p:cNvSpPr>
-            <a:spLocks noGrp="1"/>
-          </p:cNvSpPr>
-          <p:nvPr>
-            <p:ph idx="1"/>
-          </p:nvPr>
-        </p:nvSpPr>
-        <p:spPr/>
+          <p:cNvSpPr txBox="1"/>
+          <p:nvPr/>
+        </p:nvSpPr>
+        <p:spPr>
+          <a:xfrm>
+            <a:off x="100013" y="560289"/>
+            <a:ext cx="11937242" cy="381000"/>
+          </a:xfrm>
+          <a:prstGeom prst="rect">
+            <a:avLst/>
+          </a:prstGeom>
+          <a:noFill/>
+        </p:spPr>
         <p:txBody>
-          <a:bodyPr>
-            <a:normAutofit fontScale="92500" lnSpcReduction="10000"/>
+          <a:bodyPr wrap="square" rtlCol="0">
+            <a:spAutoFit/>
           </a:bodyPr>
           <a:lstStyle/>
           <a:p>
-            <a:pPr>
-              <a:buFont typeface="Arial" panose="020B0604020202020204" pitchFamily="34" charset="0"/>
-              <a:buChar char="•"/>
-            </a:pPr>
-            <a:r>
-              <a:rPr lang="en-US" dirty="0">
-                <a:latin typeface="Cambria" panose="02040503050406030204" pitchFamily="18" charset="0"/>
-              </a:rPr>
-              <a:t> Remove unwanted columns</a:t>
-            </a:r>
-          </a:p>
-          <a:p>
-            <a:pPr>
-              <a:buFont typeface="Arial" panose="020B0604020202020204" pitchFamily="34" charset="0"/>
-              <a:buChar char="•"/>
-            </a:pPr>
-            <a:r>
-              <a:rPr lang="en-US" dirty="0">
-                <a:latin typeface="Cambria" panose="02040503050406030204" pitchFamily="18" charset="0"/>
-              </a:rPr>
-              <a:t>Rename, re-arrange columns</a:t>
-            </a:r>
-          </a:p>
-          <a:p>
-            <a:pPr>
-              <a:buFont typeface="Arial" panose="020B0604020202020204" pitchFamily="34" charset="0"/>
-              <a:buChar char="•"/>
-            </a:pPr>
+            <a:pPr algn="ctr"/>
             <a:r>
               <a:rPr lang="en-US" b="1" dirty="0">
                 <a:latin typeface="Cambria" panose="02040503050406030204" pitchFamily="18" charset="0"/>
               </a:rPr>
-              <a:t>Convert empty cells to ‘0’; do not delete!</a:t>
-            </a:r>
-          </a:p>
-          <a:p>
-            <a:pPr>
-              <a:buFont typeface="Arial" panose="020B0604020202020204" pitchFamily="34" charset="0"/>
-              <a:buChar char="•"/>
-            </a:pPr>
-            <a:r>
-              <a:rPr lang="en-US" dirty="0">
-                <a:latin typeface="Cambria" panose="02040503050406030204" pitchFamily="18" charset="0"/>
-              </a:rPr>
-              <a:t>Add up sum of degrees per year with .groupby function</a:t>
-            </a:r>
-          </a:p>
-          <a:p>
-            <a:pPr>
-              <a:buFont typeface="Arial" panose="020B0604020202020204" pitchFamily="34" charset="0"/>
-              <a:buChar char="•"/>
-            </a:pPr>
-            <a:r>
-              <a:rPr lang="en-US" dirty="0">
-                <a:latin typeface="Cambria" panose="02040503050406030204" pitchFamily="18" charset="0"/>
-              </a:rPr>
-              <a:t>Created summary table with total degree per year per Degree type with Pandas dictionary</a:t>
-            </a:r>
-          </a:p>
-          <a:p>
-            <a:pPr marL="292608" lvl="1" indent="0">
-              <a:buNone/>
-            </a:pPr>
-            <a:r>
-              <a:rPr lang="en-US" dirty="0">
-                <a:latin typeface="Cambria" panose="02040503050406030204" pitchFamily="18" charset="0"/>
-              </a:rPr>
-              <a:t>CompletionPerYear = pd.DataFrame({"Shorter Certificates":df5,</a:t>
-            </a:r>
-          </a:p>
-          <a:p>
-            <a:pPr marL="292608" lvl="1" indent="0">
-              <a:buNone/>
-            </a:pPr>
-            <a:r>
-              <a:rPr lang="en-US" dirty="0">
-                <a:latin typeface="Cambria" panose="02040503050406030204" pitchFamily="18" charset="0"/>
-              </a:rPr>
-              <a:t>                     "Longer Certificates": df6,</a:t>
-            </a:r>
-          </a:p>
-          <a:p>
-            <a:pPr marL="292608" lvl="1" indent="0">
-              <a:buNone/>
-            </a:pPr>
-            <a:r>
-              <a:rPr lang="en-US" dirty="0">
-                <a:latin typeface="Cambria" panose="02040503050406030204" pitchFamily="18" charset="0"/>
-              </a:rPr>
-              <a:t>                     "Associates Degree": df7,</a:t>
-            </a:r>
-          </a:p>
-          <a:p>
-            <a:pPr marL="292608" lvl="1" indent="0">
-              <a:buNone/>
-            </a:pPr>
-            <a:r>
-              <a:rPr lang="en-US" dirty="0">
-                <a:latin typeface="Cambria" panose="02040503050406030204" pitchFamily="18" charset="0"/>
-              </a:rPr>
-              <a:t>                     "Bachelors Degree" : df8})</a:t>
-            </a:r>
-          </a:p>
-          <a:p>
-            <a:pPr>
-              <a:buFont typeface="Arial" panose="020B0604020202020204" pitchFamily="34" charset="0"/>
-              <a:buChar char="•"/>
-            </a:pPr>
-            <a:r>
-              <a:rPr lang="en-US" dirty="0">
-                <a:latin typeface="Cambria" panose="02040503050406030204" pitchFamily="18" charset="0"/>
-              </a:rPr>
-              <a:t>Total degree awarded per year = Add all 4 degrees awarded year</a:t>
-            </a:r>
-          </a:p>
-          <a:p>
-            <a:pPr>
-              <a:buFont typeface="Arial" panose="020B0604020202020204" pitchFamily="34" charset="0"/>
-              <a:buChar char="•"/>
-            </a:pPr>
-            <a:r>
-              <a:rPr lang="en-US" dirty="0">
-                <a:latin typeface="Cambria" panose="02040503050406030204" pitchFamily="18" charset="0"/>
-              </a:rPr>
-              <a:t> Plotting</a:t>
+              <a:t> Enrollment Data</a:t>
             </a:r>
           </a:p>
         </p:txBody>
       </p:sp>
+      <p:pic>
+        <p:nvPicPr>
+          <p:cNvPr id="6" name="Picture 5">
+            <a:extLst>
+              <a:ext uri="{FF2B5EF4-FFF2-40B4-BE49-F238E27FC236}">
+                <a16:creationId xmlns:a16="http://schemas.microsoft.com/office/drawing/2014/main" id="{723ADB0A-9ED1-45F2-8BED-45233C1532E6}"/>
+              </a:ext>
+            </a:extLst>
+          </p:cNvPr>
+          <p:cNvPicPr>
+            <a:picLocks noChangeAspect="1"/>
+          </p:cNvPicPr>
+          <p:nvPr/>
+        </p:nvPicPr>
+        <p:blipFill>
+          <a:blip r:embed="rId3">
+            <a:extLst>
+              <a:ext uri="{28A0092B-C50C-407E-A947-70E740481C1C}">
+                <a14:useLocalDpi xmlns:a14="http://schemas.microsoft.com/office/drawing/2010/main" val="0"/>
+              </a:ext>
+            </a:extLst>
+          </a:blip>
+          <a:stretch>
+            <a:fillRect/>
+          </a:stretch>
+        </p:blipFill>
+        <p:spPr>
+          <a:xfrm>
+            <a:off x="723275" y="1237957"/>
+            <a:ext cx="5487650" cy="3658433"/>
+          </a:xfrm>
+          <a:prstGeom prst="rect">
+            <a:avLst/>
+          </a:prstGeom>
+        </p:spPr>
+      </p:pic>
     </p:spTree>
     <p:extLst>
       <p:ext uri="{BB962C8B-B14F-4D97-AF65-F5344CB8AC3E}">
-        <p14:creationId xmlns:p14="http://schemas.microsoft.com/office/powerpoint/2010/main" val="242938779"/>
+        <p14:creationId xmlns:p14="http://schemas.microsoft.com/office/powerpoint/2010/main" val="377206099"/>
       </p:ext>
     </p:extLst>
   </p:cSld>
@@ -7502,10 +9179,10 @@
       </p:grpSpPr>
       <p:pic>
         <p:nvPicPr>
-          <p:cNvPr id="3" name="Picture 2">
+          <p:cNvPr id="3" name="Content Placeholder 4">
             <a:extLst>
               <a:ext uri="{FF2B5EF4-FFF2-40B4-BE49-F238E27FC236}">
-                <a16:creationId xmlns:a16="http://schemas.microsoft.com/office/drawing/2014/main" id="{5E3C9485-DC76-44B0-B47A-FD78BE34D340}"/>
+                <a16:creationId xmlns:a16="http://schemas.microsoft.com/office/drawing/2014/main" id="{841C6A91-3988-41E8-A5B9-531D46631746}"/>
               </a:ext>
             </a:extLst>
           </p:cNvPr>
@@ -7528,8 +9205,8 @@
         </p:blipFill>
         <p:spPr>
           <a:xfrm>
-            <a:off x="614362" y="3317568"/>
-            <a:ext cx="10963275" cy="2638730"/>
+            <a:off x="728437" y="808411"/>
+            <a:ext cx="3731567" cy="2487711"/>
           </a:xfrm>
           <a:prstGeom prst="rect">
             <a:avLst/>
@@ -7538,10 +9215,10 @@
       </p:pic>
       <p:pic>
         <p:nvPicPr>
-          <p:cNvPr id="6" name="Picture 5">
+          <p:cNvPr id="5" name="Picture 4">
             <a:extLst>
               <a:ext uri="{FF2B5EF4-FFF2-40B4-BE49-F238E27FC236}">
-                <a16:creationId xmlns:a16="http://schemas.microsoft.com/office/drawing/2014/main" id="{18374714-9846-465D-82AE-DDECA023A8F1}"/>
+                <a16:creationId xmlns:a16="http://schemas.microsoft.com/office/drawing/2014/main" id="{6B43BB14-CDCB-4A98-A3D7-FBA8E3BA42A3}"/>
               </a:ext>
             </a:extLst>
           </p:cNvPr>
@@ -7564,8 +9241,8 @@
         </p:blipFill>
         <p:spPr>
           <a:xfrm>
-            <a:off x="5181599" y="1110474"/>
-            <a:ext cx="3657600" cy="2290421"/>
+            <a:off x="4331415" y="939216"/>
+            <a:ext cx="3731567" cy="2347669"/>
           </a:xfrm>
           <a:prstGeom prst="rect">
             <a:avLst/>
@@ -7574,10 +9251,10 @@
       </p:pic>
       <p:pic>
         <p:nvPicPr>
-          <p:cNvPr id="8" name="Picture 7">
+          <p:cNvPr id="7" name="Picture 6">
             <a:extLst>
               <a:ext uri="{FF2B5EF4-FFF2-40B4-BE49-F238E27FC236}">
-                <a16:creationId xmlns:a16="http://schemas.microsoft.com/office/drawing/2014/main" id="{63AD3480-8496-4F21-A5B5-07A4F252B3DD}"/>
+                <a16:creationId xmlns:a16="http://schemas.microsoft.com/office/drawing/2014/main" id="{92A0B9B8-9566-4E3D-9D7B-DDED255C00CC}"/>
               </a:ext>
             </a:extLst>
           </p:cNvPr>
@@ -7600,8 +9277,8 @@
         </p:blipFill>
         <p:spPr>
           <a:xfrm>
-            <a:off x="1619251" y="1193801"/>
-            <a:ext cx="3352798" cy="2235199"/>
+            <a:off x="8002430" y="901756"/>
+            <a:ext cx="3591549" cy="2394366"/>
           </a:xfrm>
           <a:prstGeom prst="rect">
             <a:avLst/>
@@ -7610,10 +9287,10 @@
       </p:pic>
       <p:sp>
         <p:nvSpPr>
-          <p:cNvPr id="10" name="TextBox 9">
+          <p:cNvPr id="11" name="TextBox 10">
             <a:extLst>
               <a:ext uri="{FF2B5EF4-FFF2-40B4-BE49-F238E27FC236}">
-                <a16:creationId xmlns:a16="http://schemas.microsoft.com/office/drawing/2014/main" id="{C90BB558-2007-41FD-B5AC-120BFDAB2F67}"/>
+                <a16:creationId xmlns:a16="http://schemas.microsoft.com/office/drawing/2014/main" id="{BA4D5888-1E1E-4C24-B911-50ECB52C5AE7}"/>
               </a:ext>
             </a:extLst>
           </p:cNvPr>
@@ -7622,8 +9299,8 @@
         </p:nvSpPr>
         <p:spPr>
           <a:xfrm>
-            <a:off x="4214811" y="438150"/>
-            <a:ext cx="3433764" cy="369332"/>
+            <a:off x="0" y="210704"/>
+            <a:ext cx="12191999" cy="381000"/>
           </a:xfrm>
           <a:prstGeom prst="rect">
             <a:avLst/>
@@ -7636,11 +9313,12 @@
           </a:bodyPr>
           <a:lstStyle/>
           <a:p>
+            <a:pPr algn="ctr"/>
             <a:r>
               <a:rPr lang="en-US" b="1" dirty="0">
                 <a:latin typeface="Cambria" panose="02040503050406030204" pitchFamily="18" charset="0"/>
               </a:rPr>
-              <a:t>Summary of Degrees Awarded</a:t>
+              <a:t>Trend in Degrees Awarded</a:t>
             </a:r>
           </a:p>
         </p:txBody>
@@ -7650,7 +9328,7 @@
           <p:cNvPr id="12" name="TextBox 11">
             <a:extLst>
               <a:ext uri="{FF2B5EF4-FFF2-40B4-BE49-F238E27FC236}">
-                <a16:creationId xmlns:a16="http://schemas.microsoft.com/office/drawing/2014/main" id="{9A02FADB-63D2-4022-A04C-F539EFD8230D}"/>
+                <a16:creationId xmlns:a16="http://schemas.microsoft.com/office/drawing/2014/main" id="{B2E1C9D1-3FC3-4F1B-BC89-1CC7AD233D66}"/>
               </a:ext>
             </a:extLst>
           </p:cNvPr>
@@ -7659,17 +9337,15 @@
         </p:nvSpPr>
         <p:spPr>
           <a:xfrm>
-            <a:off x="9048749" y="1992968"/>
-            <a:ext cx="1400176" cy="1169551"/>
+            <a:off x="225271" y="5850225"/>
+            <a:ext cx="11741458" cy="342713"/>
           </a:xfrm>
           <a:prstGeom prst="rect">
             <a:avLst/>
           </a:prstGeom>
           <a:noFill/>
           <a:ln>
-            <a:solidFill>
-              <a:srgbClr val="0033CC"/>
-            </a:solidFill>
+            <a:noFill/>
           </a:ln>
         </p:spPr>
         <p:txBody>
@@ -7678,19 +9354,128 @@
           </a:bodyPr>
           <a:lstStyle/>
           <a:p>
-            <a:r>
-              <a:rPr lang="en-US" sz="1400" dirty="0">
+            <a:pPr algn="ctr"/>
+            <a:r>
+              <a:rPr lang="en-US" sz="1600" dirty="0">
                 <a:latin typeface="Cambria" panose="02040503050406030204" pitchFamily="18" charset="0"/>
               </a:rPr>
-              <a:t>On average ~87% of total graduates had Bachelor's Degree</a:t>
+              <a:t>Increase in short term degrees appear to correlate with increase in unemployment rate</a:t>
             </a:r>
           </a:p>
         </p:txBody>
       </p:sp>
+      <p:pic>
+        <p:nvPicPr>
+          <p:cNvPr id="9" name="Picture 8">
+            <a:extLst>
+              <a:ext uri="{FF2B5EF4-FFF2-40B4-BE49-F238E27FC236}">
+                <a16:creationId xmlns:a16="http://schemas.microsoft.com/office/drawing/2014/main" id="{0257016F-9C4E-4799-9C8F-CA609F854B4A}"/>
+              </a:ext>
+            </a:extLst>
+          </p:cNvPr>
+          <p:cNvPicPr>
+            <a:picLocks noChangeAspect="1"/>
+          </p:cNvPicPr>
+          <p:nvPr/>
+        </p:nvPicPr>
+        <p:blipFill>
+          <a:blip r:embed="rId5">
+            <a:extLst>
+              <a:ext uri="{28A0092B-C50C-407E-A947-70E740481C1C}">
+                <a14:useLocalDpi xmlns:a14="http://schemas.microsoft.com/office/drawing/2010/main" val="0"/>
+              </a:ext>
+            </a:extLst>
+          </a:blip>
+          <a:stretch>
+            <a:fillRect/>
+          </a:stretch>
+        </p:blipFill>
+        <p:spPr>
+          <a:xfrm>
+            <a:off x="4330542" y="3531699"/>
+            <a:ext cx="3657600" cy="2290421"/>
+          </a:xfrm>
+          <a:prstGeom prst="rect">
+            <a:avLst/>
+          </a:prstGeom>
+        </p:spPr>
+      </p:pic>
+      <p:pic>
+        <p:nvPicPr>
+          <p:cNvPr id="10" name="Picture 9">
+            <a:extLst>
+              <a:ext uri="{FF2B5EF4-FFF2-40B4-BE49-F238E27FC236}">
+                <a16:creationId xmlns:a16="http://schemas.microsoft.com/office/drawing/2014/main" id="{DA437459-8BD1-4167-B054-02B78EB0667F}"/>
+              </a:ext>
+            </a:extLst>
+          </p:cNvPr>
+          <p:cNvPicPr>
+            <a:picLocks noChangeAspect="1"/>
+          </p:cNvPicPr>
+          <p:nvPr/>
+        </p:nvPicPr>
+        <p:blipFill>
+          <a:blip r:embed="rId6">
+            <a:extLst>
+              <a:ext uri="{28A0092B-C50C-407E-A947-70E740481C1C}">
+                <a14:useLocalDpi xmlns:a14="http://schemas.microsoft.com/office/drawing/2010/main" val="0"/>
+              </a:ext>
+            </a:extLst>
+          </a:blip>
+          <a:stretch>
+            <a:fillRect/>
+          </a:stretch>
+        </p:blipFill>
+        <p:spPr>
+          <a:xfrm>
+            <a:off x="768194" y="3615026"/>
+            <a:ext cx="3352798" cy="2235199"/>
+          </a:xfrm>
+          <a:prstGeom prst="rect">
+            <a:avLst/>
+          </a:prstGeom>
+        </p:spPr>
+      </p:pic>
+      <p:pic>
+        <p:nvPicPr>
+          <p:cNvPr id="13" name="Picture 12">
+            <a:extLst>
+              <a:ext uri="{FF2B5EF4-FFF2-40B4-BE49-F238E27FC236}">
+                <a16:creationId xmlns:a16="http://schemas.microsoft.com/office/drawing/2014/main" id="{08A4C19D-AB0D-4E8C-883D-DA847AC2F3AE}"/>
+              </a:ext>
+            </a:extLst>
+          </p:cNvPr>
+          <p:cNvPicPr>
+            <a:picLocks noChangeAspect="1"/>
+          </p:cNvPicPr>
+          <p:nvPr/>
+        </p:nvPicPr>
+        <p:blipFill>
+          <a:blip r:embed="rId7">
+            <a:extLst>
+              <a:ext uri="{28A0092B-C50C-407E-A947-70E740481C1C}">
+                <a14:useLocalDpi xmlns:a14="http://schemas.microsoft.com/office/drawing/2010/main" val="0"/>
+              </a:ext>
+            </a:extLst>
+          </a:blip>
+          <a:stretch>
+            <a:fillRect/>
+          </a:stretch>
+        </p:blipFill>
+        <p:spPr>
+          <a:xfrm>
+            <a:off x="7922091" y="3381850"/>
+            <a:ext cx="3657600" cy="2438399"/>
+          </a:xfrm>
+          <a:prstGeom prst="rect">
+            <a:avLst/>
+          </a:prstGeom>
+        </p:spPr>
+      </p:pic>
     </p:spTree>
     <p:extLst>
       <p:ext uri="{BB962C8B-B14F-4D97-AF65-F5344CB8AC3E}">
-        <p14:creationId xmlns:p14="http://schemas.microsoft.com/office/powerpoint/2010/main" val="3132460201"/>
+        <p14:creationId xmlns:p14="http://schemas.microsoft.com/office/powerpoint/2010/main" val="1012556742"/>
       </p:ext>
     </p:extLst>
   </p:cSld>

</xml_diff>